<commit_message>
update files for today's class
</commit_message>
<xml_diff>
--- a/2. Data Management/Wk4 - Datasheets and Coding with Style.pptx
+++ b/2. Data Management/Wk4 - Datasheets and Coding with Style.pptx
@@ -5,22 +5,29 @@
     <p:sldMasterId id="2147483660" r:id="rId1"/>
   </p:sldMasterIdLst>
   <p:notesMasterIdLst>
-    <p:notesMasterId r:id="rId15"/>
+    <p:notesMasterId r:id="rId22"/>
   </p:notesMasterIdLst>
   <p:sldIdLst>
     <p:sldId id="256" r:id="rId2"/>
-    <p:sldId id="265" r:id="rId3"/>
-    <p:sldId id="262" r:id="rId4"/>
-    <p:sldId id="263" r:id="rId5"/>
-    <p:sldId id="257" r:id="rId6"/>
-    <p:sldId id="258" r:id="rId7"/>
-    <p:sldId id="259" r:id="rId8"/>
-    <p:sldId id="288" r:id="rId9"/>
-    <p:sldId id="268" r:id="rId10"/>
-    <p:sldId id="269" r:id="rId11"/>
-    <p:sldId id="270" r:id="rId12"/>
-    <p:sldId id="271" r:id="rId13"/>
-    <p:sldId id="272" r:id="rId14"/>
+    <p:sldId id="295" r:id="rId3"/>
+    <p:sldId id="294" r:id="rId4"/>
+    <p:sldId id="265" r:id="rId5"/>
+    <p:sldId id="262" r:id="rId6"/>
+    <p:sldId id="263" r:id="rId7"/>
+    <p:sldId id="289" r:id="rId8"/>
+    <p:sldId id="257" r:id="rId9"/>
+    <p:sldId id="259" r:id="rId10"/>
+    <p:sldId id="292" r:id="rId11"/>
+    <p:sldId id="258" r:id="rId12"/>
+    <p:sldId id="288" r:id="rId13"/>
+    <p:sldId id="268" r:id="rId14"/>
+    <p:sldId id="269" r:id="rId15"/>
+    <p:sldId id="270" r:id="rId16"/>
+    <p:sldId id="290" r:id="rId17"/>
+    <p:sldId id="271" r:id="rId18"/>
+    <p:sldId id="272" r:id="rId19"/>
+    <p:sldId id="291" r:id="rId20"/>
+    <p:sldId id="293" r:id="rId21"/>
   </p:sldIdLst>
   <p:sldSz cx="9144000" cy="6858000" type="screen4x3"/>
   <p:notesSz cx="6858000" cy="9144000"/>
@@ -209,7 +216,7 @@
           <a:p>
             <a:fld id="{24D835DA-F873-4441-A9ED-91E9C627787D}" type="datetimeFigureOut">
               <a:rPr lang="en-US" smtClean="0"/>
-              <a:t>9/8/21</a:t>
+              <a:t>9/13/21</a:t>
             </a:fld>
             <a:endParaRPr lang="en-US"/>
           </a:p>
@@ -541,7 +548,7 @@
           <a:p>
             <a:fld id="{62F97255-B693-B54F-97EA-E621787727F9}" type="slidenum">
               <a:rPr lang="en-US" smtClean="0"/>
-              <a:t>12</a:t>
+              <a:t>17</a:t>
             </a:fld>
             <a:endParaRPr lang="en-US"/>
           </a:p>
@@ -691,7 +698,7 @@
           <a:p>
             <a:fld id="{D17AE834-0754-0944-8EF4-349530BA008F}" type="datetimeFigureOut">
               <a:rPr lang="en-US" smtClean="0"/>
-              <a:t>9/8/21</a:t>
+              <a:t>9/13/21</a:t>
             </a:fld>
             <a:endParaRPr lang="en-US"/>
           </a:p>
@@ -861,7 +868,7 @@
           <a:p>
             <a:fld id="{D17AE834-0754-0944-8EF4-349530BA008F}" type="datetimeFigureOut">
               <a:rPr lang="en-US" smtClean="0"/>
-              <a:t>9/8/21</a:t>
+              <a:t>9/13/21</a:t>
             </a:fld>
             <a:endParaRPr lang="en-US"/>
           </a:p>
@@ -1041,7 +1048,7 @@
           <a:p>
             <a:fld id="{D17AE834-0754-0944-8EF4-349530BA008F}" type="datetimeFigureOut">
               <a:rPr lang="en-US" smtClean="0"/>
-              <a:t>9/8/21</a:t>
+              <a:t>9/13/21</a:t>
             </a:fld>
             <a:endParaRPr lang="en-US"/>
           </a:p>
@@ -1211,7 +1218,7 @@
           <a:p>
             <a:fld id="{D17AE834-0754-0944-8EF4-349530BA008F}" type="datetimeFigureOut">
               <a:rPr lang="en-US" smtClean="0"/>
-              <a:t>9/8/21</a:t>
+              <a:t>9/13/21</a:t>
             </a:fld>
             <a:endParaRPr lang="en-US"/>
           </a:p>
@@ -1455,7 +1462,7 @@
           <a:p>
             <a:fld id="{D17AE834-0754-0944-8EF4-349530BA008F}" type="datetimeFigureOut">
               <a:rPr lang="en-US" smtClean="0"/>
-              <a:t>9/8/21</a:t>
+              <a:t>9/13/21</a:t>
             </a:fld>
             <a:endParaRPr lang="en-US"/>
           </a:p>
@@ -1687,7 +1694,7 @@
           <a:p>
             <a:fld id="{D17AE834-0754-0944-8EF4-349530BA008F}" type="datetimeFigureOut">
               <a:rPr lang="en-US" smtClean="0"/>
-              <a:t>9/8/21</a:t>
+              <a:t>9/13/21</a:t>
             </a:fld>
             <a:endParaRPr lang="en-US"/>
           </a:p>
@@ -2054,7 +2061,7 @@
           <a:p>
             <a:fld id="{D17AE834-0754-0944-8EF4-349530BA008F}" type="datetimeFigureOut">
               <a:rPr lang="en-US" smtClean="0"/>
-              <a:t>9/8/21</a:t>
+              <a:t>9/13/21</a:t>
             </a:fld>
             <a:endParaRPr lang="en-US"/>
           </a:p>
@@ -2172,7 +2179,7 @@
           <a:p>
             <a:fld id="{D17AE834-0754-0944-8EF4-349530BA008F}" type="datetimeFigureOut">
               <a:rPr lang="en-US" smtClean="0"/>
-              <a:t>9/8/21</a:t>
+              <a:t>9/13/21</a:t>
             </a:fld>
             <a:endParaRPr lang="en-US"/>
           </a:p>
@@ -2267,7 +2274,7 @@
           <a:p>
             <a:fld id="{D17AE834-0754-0944-8EF4-349530BA008F}" type="datetimeFigureOut">
               <a:rPr lang="en-US" smtClean="0"/>
-              <a:t>9/8/21</a:t>
+              <a:t>9/13/21</a:t>
             </a:fld>
             <a:endParaRPr lang="en-US"/>
           </a:p>
@@ -2544,7 +2551,7 @@
           <a:p>
             <a:fld id="{D17AE834-0754-0944-8EF4-349530BA008F}" type="datetimeFigureOut">
               <a:rPr lang="en-US" smtClean="0"/>
-              <a:t>9/8/21</a:t>
+              <a:t>9/13/21</a:t>
             </a:fld>
             <a:endParaRPr lang="en-US"/>
           </a:p>
@@ -2801,7 +2808,7 @@
           <a:p>
             <a:fld id="{D17AE834-0754-0944-8EF4-349530BA008F}" type="datetimeFigureOut">
               <a:rPr lang="en-US" smtClean="0"/>
-              <a:t>9/8/21</a:t>
+              <a:t>9/13/21</a:t>
             </a:fld>
             <a:endParaRPr lang="en-US"/>
           </a:p>
@@ -3014,7 +3021,7 @@
           <a:p>
             <a:fld id="{D17AE834-0754-0944-8EF4-349530BA008F}" type="datetimeFigureOut">
               <a:rPr lang="en-US" smtClean="0"/>
-              <a:t>9/8/21</a:t>
+              <a:t>9/13/21</a:t>
             </a:fld>
             <a:endParaRPr lang="en-US"/>
           </a:p>
@@ -3503,6 +3510,17 @@
 <file path=ppt/slides/slide10.xml><?xml version="1.0" encoding="utf-8"?>
 <p:sld xmlns:a="http://schemas.openxmlformats.org/drawingml/2006/main" xmlns:r="http://schemas.openxmlformats.org/officeDocument/2006/relationships" xmlns:p="http://schemas.openxmlformats.org/presentationml/2006/main">
   <p:cSld>
+    <p:bg>
+      <p:bgPr>
+        <a:solidFill>
+          <a:schemeClr val="accent6">
+            <a:lumMod val="40000"/>
+            <a:lumOff val="60000"/>
+          </a:schemeClr>
+        </a:solidFill>
+        <a:effectLst/>
+      </p:bgPr>
+    </p:bg>
     <p:spTree>
       <p:nvGrpSpPr>
         <p:cNvPr id="1" name=""/>
@@ -3519,7 +3537,13 @@
       </p:grpSpPr>
       <p:sp>
         <p:nvSpPr>
-          <p:cNvPr id="2" name="Title 1"/>
+          <p:cNvPr id="2" name="Title 1">
+            <a:extLst>
+              <a:ext uri="{FF2B5EF4-FFF2-40B4-BE49-F238E27FC236}">
+                <a16:creationId xmlns:a16="http://schemas.microsoft.com/office/drawing/2014/main" id="{4B51A71F-C914-7C47-832D-38622C3F666B}"/>
+              </a:ext>
+            </a:extLst>
+          </p:cNvPr>
           <p:cNvSpPr>
             <a:spLocks noGrp="1"/>
           </p:cNvSpPr>
@@ -3529,21 +3553,25 @@
         </p:nvSpPr>
         <p:spPr/>
         <p:txBody>
-          <a:bodyPr>
-            <a:normAutofit/>
-          </a:bodyPr>
-          <a:lstStyle/>
-          <a:p>
-            <a:r>
-              <a:rPr lang="en-US" dirty="0"/>
-              <a:t>Which of these filenames are good/bad? Why?</a:t>
-            </a:r>
-          </a:p>
-        </p:txBody>
-      </p:sp>
-      <p:sp>
-        <p:nvSpPr>
-          <p:cNvPr id="3" name="Content Placeholder 2"/>
+          <a:bodyPr/>
+          <a:lstStyle/>
+          <a:p>
+            <a:r>
+              <a:rPr lang="en-US" dirty="0"/>
+              <a:t>2. Make a tidy database, continued</a:t>
+            </a:r>
+          </a:p>
+        </p:txBody>
+      </p:sp>
+      <p:sp>
+        <p:nvSpPr>
+          <p:cNvPr id="3" name="Content Placeholder 2">
+            <a:extLst>
+              <a:ext uri="{FF2B5EF4-FFF2-40B4-BE49-F238E27FC236}">
+                <a16:creationId xmlns:a16="http://schemas.microsoft.com/office/drawing/2014/main" id="{D5611A4F-3758-F346-AF5A-9DE8388E8C78}"/>
+              </a:ext>
+            </a:extLst>
+          </p:cNvPr>
           <p:cNvSpPr>
             <a:spLocks noGrp="1"/>
           </p:cNvSpPr>
@@ -3553,75 +3581,37 @@
         </p:nvSpPr>
         <p:spPr/>
         <p:txBody>
-          <a:bodyPr>
-            <a:normAutofit/>
-          </a:bodyPr>
-          <a:lstStyle/>
-          <a:p>
-            <a:r>
-              <a:rPr lang="en-US" dirty="0" err="1"/>
-              <a:t>Stuff.R</a:t>
-            </a:r>
-            <a:endParaRPr lang="en-US" dirty="0"/>
-          </a:p>
-          <a:p>
-            <a:r>
-              <a:rPr lang="en-US" dirty="0"/>
-              <a:t>Model1 experiment@site1.R</a:t>
-            </a:r>
-          </a:p>
-          <a:p>
-            <a:r>
-              <a:rPr lang="en-US" dirty="0" err="1"/>
-              <a:t>AdultGPS</a:t>
-            </a:r>
-            <a:r>
-              <a:rPr lang="en-US" dirty="0"/>
-              <a:t> </a:t>
-            </a:r>
-            <a:r>
-              <a:rPr lang="en-US" dirty="0" err="1"/>
-              <a:t>Munge.R</a:t>
-            </a:r>
-            <a:endParaRPr lang="en-US" dirty="0"/>
-          </a:p>
-          <a:p>
-            <a:r>
-              <a:rPr lang="en-US" dirty="0" err="1"/>
-              <a:t>Make_dataframes.R</a:t>
-            </a:r>
-            <a:endParaRPr lang="en-US" dirty="0"/>
-          </a:p>
-          <a:p>
-            <a:r>
-              <a:rPr lang="en-US" dirty="0"/>
-              <a:t>Merge </a:t>
-            </a:r>
-            <a:r>
-              <a:rPr lang="en-US" dirty="0" err="1"/>
-              <a:t>Code.R</a:t>
-            </a:r>
-            <a:endParaRPr lang="en-US" dirty="0"/>
-          </a:p>
-          <a:p>
-            <a:r>
-              <a:rPr lang="en-US" dirty="0" err="1"/>
-              <a:t>Munge.R</a:t>
-            </a:r>
-            <a:endParaRPr lang="en-US" dirty="0"/>
-          </a:p>
-          <a:p>
-            <a:r>
-              <a:rPr lang="en-US" dirty="0"/>
-              <a:t>RatPredation19Jul12_no_treat.R</a:t>
-            </a:r>
-          </a:p>
-          <a:p>
-            <a:r>
-              <a:rPr lang="en-US" dirty="0" err="1"/>
-              <a:t>LunchinatoR.R</a:t>
-            </a:r>
-            <a:endParaRPr lang="en-US" dirty="0"/>
+          <a:bodyPr/>
+          <a:lstStyle/>
+          <a:p>
+            <a:r>
+              <a:rPr lang="en-US" dirty="0"/>
+              <a:t>Do not calculate new values from measured data in Excel. Do that in R.</a:t>
+            </a:r>
+          </a:p>
+          <a:p>
+            <a:r>
+              <a:rPr lang="en-US" dirty="0"/>
+              <a:t>Identify estimated data (should not be entered in a manner identical to measured data)</a:t>
+            </a:r>
+          </a:p>
+          <a:p>
+            <a:r>
+              <a:rPr lang="en-US" dirty="0"/>
+              <a:t>Separate data from notes</a:t>
+            </a:r>
+          </a:p>
+          <a:p>
+            <a:r>
+              <a:rPr lang="en-US" dirty="0"/>
+              <a:t>Do not fill cells with colors that are meaningful</a:t>
+            </a:r>
+          </a:p>
+          <a:p>
+            <a:r>
+              <a:rPr lang="en-US" dirty="0"/>
+              <a:t>Do not skip lines</a:t>
+            </a:r>
           </a:p>
           <a:p>
             <a:endParaRPr lang="en-US" dirty="0"/>
@@ -3631,7 +3621,7 @@
     </p:spTree>
     <p:extLst>
       <p:ext uri="{BB962C8B-B14F-4D97-AF65-F5344CB8AC3E}">
-        <p14:creationId xmlns:p14="http://schemas.microsoft.com/office/powerpoint/2010/main" val="2811347013"/>
+        <p14:creationId xmlns:p14="http://schemas.microsoft.com/office/powerpoint/2010/main" val="1153647272"/>
       </p:ext>
     </p:extLst>
   </p:cSld>
@@ -3644,6 +3634,17 @@
 <file path=ppt/slides/slide11.xml><?xml version="1.0" encoding="utf-8"?>
 <p:sld xmlns:a="http://schemas.openxmlformats.org/drawingml/2006/main" xmlns:r="http://schemas.openxmlformats.org/officeDocument/2006/relationships" xmlns:p="http://schemas.openxmlformats.org/presentationml/2006/main">
   <p:cSld>
+    <p:bg>
+      <p:bgPr>
+        <a:solidFill>
+          <a:schemeClr val="accent6">
+            <a:lumMod val="40000"/>
+            <a:lumOff val="60000"/>
+          </a:schemeClr>
+        </a:solidFill>
+        <a:effectLst/>
+      </p:bgPr>
+    </p:bg>
     <p:spTree>
       <p:nvGrpSpPr>
         <p:cNvPr id="1" name=""/>
@@ -3675,15 +3676,7 @@
           <a:p>
             <a:r>
               <a:rPr lang="en-US" dirty="0"/>
-              <a:t>3. </a:t>
-            </a:r>
-            <a:r>
-              <a:rPr lang="en-US" dirty="0" err="1"/>
-              <a:t>Styleguide</a:t>
-            </a:r>
-            <a:r>
-              <a:rPr lang="en-US" dirty="0"/>
-              <a:t> – script structure</a:t>
+              <a:t>Exercise</a:t>
             </a:r>
           </a:p>
         </p:txBody>
@@ -3700,41 +3693,38 @@
         </p:nvSpPr>
         <p:spPr/>
         <p:txBody>
-          <a:bodyPr>
-            <a:normAutofit/>
-          </a:bodyPr>
-          <a:lstStyle/>
-          <a:p>
-            <a:r>
-              <a:rPr lang="en-US" dirty="0"/>
-              <a:t>Start script with a title and description </a:t>
-            </a:r>
-          </a:p>
-          <a:p>
-            <a:r>
-              <a:rPr lang="en-US" dirty="0"/>
-              <a:t>Use commented lines to break up your file into easily readable chunks.</a:t>
-            </a:r>
-          </a:p>
-          <a:p>
-            <a:pPr lvl="1"/>
-            <a:r>
-              <a:rPr lang="en-US" dirty="0"/>
-              <a:t># Read in data -----------------------</a:t>
-            </a:r>
-          </a:p>
-          <a:p>
-            <a:r>
-              <a:rPr lang="en-US" dirty="0"/>
-              <a:t>If your script uses external packages (libraries), load them all at once at the very beginning of the file. </a:t>
-            </a:r>
+          <a:bodyPr/>
+          <a:lstStyle/>
+          <a:p>
+            <a:r>
+              <a:rPr lang="en-US" dirty="0"/>
+              <a:t>Open up your own database</a:t>
+            </a:r>
+          </a:p>
+          <a:p>
+            <a:r>
+              <a:rPr lang="en-US" dirty="0"/>
+              <a:t>What would you change in your database? </a:t>
+            </a:r>
+          </a:p>
+          <a:p>
+            <a:r>
+              <a:rPr lang="en-US" dirty="0"/>
+              <a:t>Can you make those changes in R? </a:t>
+            </a:r>
+          </a:p>
+          <a:p>
+            <a:endParaRPr lang="en-US" dirty="0"/>
+          </a:p>
+          <a:p>
+            <a:endParaRPr lang="en-US" dirty="0"/>
           </a:p>
         </p:txBody>
       </p:sp>
     </p:spTree>
     <p:extLst>
       <p:ext uri="{BB962C8B-B14F-4D97-AF65-F5344CB8AC3E}">
-        <p14:creationId xmlns:p14="http://schemas.microsoft.com/office/powerpoint/2010/main" val="398975198"/>
+        <p14:creationId xmlns:p14="http://schemas.microsoft.com/office/powerpoint/2010/main" val="587847242"/>
       </p:ext>
     </p:extLst>
   </p:cSld>
@@ -3747,6 +3737,17 @@
 <file path=ppt/slides/slide12.xml><?xml version="1.0" encoding="utf-8"?>
 <p:sld xmlns:a="http://schemas.openxmlformats.org/drawingml/2006/main" xmlns:r="http://schemas.openxmlformats.org/officeDocument/2006/relationships" xmlns:p="http://schemas.openxmlformats.org/presentationml/2006/main">
   <p:cSld>
+    <p:bg>
+      <p:bgPr>
+        <a:solidFill>
+          <a:schemeClr val="accent2">
+            <a:lumMod val="40000"/>
+            <a:lumOff val="60000"/>
+          </a:schemeClr>
+        </a:solidFill>
+        <a:effectLst/>
+      </p:bgPr>
+    </p:bg>
     <p:spTree>
       <p:nvGrpSpPr>
         <p:cNvPr id="1" name=""/>
@@ -3778,15 +3779,7 @@
           <a:p>
             <a:r>
               <a:rPr lang="en-US" dirty="0"/>
-              <a:t>3. </a:t>
-            </a:r>
-            <a:r>
-              <a:rPr lang="en-US" dirty="0" err="1"/>
-              <a:t>Styleguide</a:t>
-            </a:r>
-            <a:r>
-              <a:rPr lang="en-US" dirty="0"/>
-              <a:t> - Syntax</a:t>
+              <a:t>3. Code with style</a:t>
             </a:r>
           </a:p>
         </p:txBody>
@@ -3801,48 +3794,134 @@
             <p:ph idx="1"/>
           </p:nvPr>
         </p:nvSpPr>
-        <p:spPr/>
+        <p:spPr>
+          <a:xfrm>
+            <a:off x="457200" y="1600200"/>
+            <a:ext cx="8229600" cy="4953000"/>
+          </a:xfrm>
+        </p:spPr>
         <p:txBody>
           <a:bodyPr>
-            <a:normAutofit/>
+            <a:normAutofit fontScale="92500" lnSpcReduction="10000"/>
           </a:bodyPr>
           <a:lstStyle/>
           <a:p>
-            <a:r>
-              <a:rPr lang="en-US" dirty="0"/>
-              <a:t>Variable and function names should use CamelCase or all lowercase</a:t>
-            </a:r>
-          </a:p>
-          <a:p>
-            <a:r>
-              <a:rPr lang="en-US" dirty="0"/>
-              <a:t>Use underscores (_) to separate words within a name</a:t>
-            </a:r>
-          </a:p>
-          <a:p>
-            <a:r>
-              <a:rPr lang="en-US" dirty="0"/>
-              <a:t>Variable names should be nouns and function names should be verbs </a:t>
-            </a:r>
-          </a:p>
-          <a:p>
-            <a:r>
-              <a:rPr lang="en-US" dirty="0"/>
-              <a:t>Be concise when naming</a:t>
-            </a:r>
-          </a:p>
-          <a:p>
-            <a:r>
-              <a:rPr lang="en-US" dirty="0"/>
-              <a:t>Avoid re-using names of common functions and variables</a:t>
-            </a:r>
+            <a:pPr marL="0" indent="0" algn="ctr">
+              <a:buNone/>
+            </a:pPr>
+            <a:r>
+              <a:rPr lang="en-US" dirty="0"/>
+              <a:t>Style is important so YOU and OTHERS can read your code and actually use it</a:t>
+            </a:r>
+          </a:p>
+          <a:p>
+            <a:pPr marL="0" indent="0">
+              <a:buNone/>
+            </a:pPr>
+            <a:endParaRPr lang="en-US" dirty="0"/>
+          </a:p>
+          <a:p>
+            <a:r>
+              <a:rPr lang="en-US" dirty="0">
+                <a:hlinkClick r:id="rId2"/>
+              </a:rPr>
+              <a:t>Tidyverse Style Guide</a:t>
+            </a:r>
+            <a:endParaRPr lang="en-US" dirty="0"/>
+          </a:p>
+          <a:p>
+            <a:r>
+              <a:rPr lang="en-US" dirty="0">
+                <a:hlinkClick r:id="rId3">
+                  <a:extLst>
+                    <a:ext uri="{A12FA001-AC4F-418D-AE19-62706E023703}">
+                      <ahyp:hlinkClr xmlns:ahyp="http://schemas.microsoft.com/office/drawing/2018/hyperlinkcolor" val="tx"/>
+                    </a:ext>
+                  </a:extLst>
+                </a:hlinkClick>
+              </a:rPr>
+              <a:t>Hadley Wickham's style guide</a:t>
+            </a:r>
+            <a:endParaRPr lang="en-US" dirty="0">
+              <a:hlinkClick r:id="rId4">
+                <a:extLst>
+                  <a:ext uri="{A12FA001-AC4F-418D-AE19-62706E023703}">
+                    <ahyp:hlinkClr xmlns:ahyp="http://schemas.microsoft.com/office/drawing/2018/hyperlinkcolor" val="tx"/>
+                  </a:ext>
+                </a:extLst>
+              </a:hlinkClick>
+            </a:endParaRPr>
+          </a:p>
+          <a:p>
+            <a:r>
+              <a:rPr lang="en-US" dirty="0">
+                <a:hlinkClick r:id="rId4">
+                  <a:extLst>
+                    <a:ext uri="{A12FA001-AC4F-418D-AE19-62706E023703}">
+                      <ahyp:hlinkClr xmlns:ahyp="http://schemas.microsoft.com/office/drawing/2018/hyperlinkcolor" val="tx"/>
+                    </a:ext>
+                  </a:extLst>
+                </a:hlinkClick>
+              </a:rPr>
+              <a:t>Google style guide</a:t>
+            </a:r>
+            <a:endParaRPr lang="en-US" dirty="0"/>
+          </a:p>
+          <a:p>
+            <a:r>
+              <a:rPr lang="en-US" dirty="0">
+                <a:hlinkClick r:id="rId5">
+                  <a:extLst>
+                    <a:ext uri="{A12FA001-AC4F-418D-AE19-62706E023703}">
+                      <ahyp:hlinkClr xmlns:ahyp="http://schemas.microsoft.com/office/drawing/2018/hyperlinkcolor" val="tx"/>
+                    </a:ext>
+                  </a:extLst>
+                </a:hlinkClick>
+              </a:rPr>
+              <a:t>Condensed version of Google/Hadley guide</a:t>
+            </a:r>
+            <a:endParaRPr lang="en-US" dirty="0"/>
+          </a:p>
+          <a:p>
+            <a:r>
+              <a:rPr lang="en-US" dirty="0">
+                <a:hlinkClick r:id="rId6">
+                  <a:extLst>
+                    <a:ext uri="{A12FA001-AC4F-418D-AE19-62706E023703}">
+                      <ahyp:hlinkClr xmlns:ahyp="http://schemas.microsoft.com/office/drawing/2018/hyperlinkcolor" val="tx"/>
+                    </a:ext>
+                  </a:extLst>
+                </a:hlinkClick>
+              </a:rPr>
+              <a:t>Henrik Bengtsson style guide</a:t>
+            </a:r>
+            <a:endParaRPr lang="en-US" dirty="0"/>
+          </a:p>
+          <a:p>
+            <a:endParaRPr lang="en-US" dirty="0"/>
+          </a:p>
+          <a:p>
+            <a:r>
+              <a:rPr lang="en-US" dirty="0"/>
+              <a:t>R Studio- Preferences – Code – Diagnostics</a:t>
+            </a:r>
+          </a:p>
+          <a:p>
+            <a:pPr lvl="1"/>
+            <a:r>
+              <a:rPr lang="en-US" dirty="0"/>
+              <a:t>check all of the R Diagnostics boxes to get help with your coding style </a:t>
+            </a:r>
+          </a:p>
+          <a:p>
+            <a:endParaRPr lang="en-US" dirty="0"/>
           </a:p>
         </p:txBody>
       </p:sp>
     </p:spTree>
     <p:extLst>
       <p:ext uri="{BB962C8B-B14F-4D97-AF65-F5344CB8AC3E}">
-        <p14:creationId xmlns:p14="http://schemas.microsoft.com/office/powerpoint/2010/main" val="150362671"/>
+        <p14:creationId xmlns:p14="http://schemas.microsoft.com/office/powerpoint/2010/main" val="254822252"/>
       </p:ext>
     </p:extLst>
   </p:cSld>
@@ -3855,6 +3934,17 @@
 <file path=ppt/slides/slide13.xml><?xml version="1.0" encoding="utf-8"?>
 <p:sld xmlns:a="http://schemas.openxmlformats.org/drawingml/2006/main" xmlns:r="http://schemas.openxmlformats.org/officeDocument/2006/relationships" xmlns:p="http://schemas.openxmlformats.org/presentationml/2006/main">
   <p:cSld>
+    <p:bg>
+      <p:bgPr>
+        <a:solidFill>
+          <a:schemeClr val="accent2">
+            <a:lumMod val="40000"/>
+            <a:lumOff val="60000"/>
+          </a:schemeClr>
+        </a:solidFill>
+        <a:effectLst/>
+      </p:bgPr>
+    </p:bg>
     <p:spTree>
       <p:nvGrpSpPr>
         <p:cNvPr id="1" name=""/>
@@ -3894,7 +3984,7 @@
             </a:r>
             <a:r>
               <a:rPr lang="en-US" dirty="0"/>
-              <a:t> - spacing</a:t>
+              <a:t>: Filenames</a:t>
             </a:r>
           </a:p>
         </p:txBody>
@@ -3907,6 +3997,93 @@
           </p:cNvSpPr>
           <p:nvPr>
             <p:ph idx="1"/>
+          </p:nvPr>
+        </p:nvSpPr>
+        <p:spPr/>
+        <p:txBody>
+          <a:bodyPr/>
+          <a:lstStyle/>
+          <a:p>
+            <a:r>
+              <a:rPr lang="en-US" dirty="0"/>
+              <a:t>Make meaningful filenames</a:t>
+            </a:r>
+          </a:p>
+          <a:p>
+            <a:r>
+              <a:rPr lang="en-US" dirty="0"/>
+              <a:t>Use _ to separate words (snake case)</a:t>
+            </a:r>
+          </a:p>
+          <a:p>
+            <a:r>
+              <a:rPr lang="en-US" dirty="0"/>
+              <a:t>Do not use spaces or special characters (only numbers, letters, -, and _). </a:t>
+            </a:r>
+          </a:p>
+          <a:p>
+            <a:r>
+              <a:rPr lang="en-US" dirty="0"/>
+              <a:t>Lower-case or CamelCase</a:t>
+            </a:r>
+          </a:p>
+          <a:p>
+            <a:r>
+              <a:rPr lang="en-US" dirty="0"/>
+              <a:t>If need to be run in a particular order, name them starting with 01, 02, 03 etc. </a:t>
+            </a:r>
+          </a:p>
+        </p:txBody>
+      </p:sp>
+    </p:spTree>
+    <p:extLst>
+      <p:ext uri="{BB962C8B-B14F-4D97-AF65-F5344CB8AC3E}">
+        <p14:creationId xmlns:p14="http://schemas.microsoft.com/office/powerpoint/2010/main" val="3609313730"/>
+      </p:ext>
+    </p:extLst>
+  </p:cSld>
+  <p:clrMapOvr>
+    <a:masterClrMapping/>
+  </p:clrMapOvr>
+</p:sld>
+</file>
+
+<file path=ppt/slides/slide14.xml><?xml version="1.0" encoding="utf-8"?>
+<p:sld xmlns:a="http://schemas.openxmlformats.org/drawingml/2006/main" xmlns:r="http://schemas.openxmlformats.org/officeDocument/2006/relationships" xmlns:p="http://schemas.openxmlformats.org/presentationml/2006/main">
+  <p:cSld>
+    <p:bg>
+      <p:bgPr>
+        <a:solidFill>
+          <a:schemeClr val="accent2">
+            <a:lumMod val="40000"/>
+            <a:lumOff val="60000"/>
+          </a:schemeClr>
+        </a:solidFill>
+        <a:effectLst/>
+      </p:bgPr>
+    </p:bg>
+    <p:spTree>
+      <p:nvGrpSpPr>
+        <p:cNvPr id="1" name=""/>
+        <p:cNvGrpSpPr/>
+        <p:nvPr/>
+      </p:nvGrpSpPr>
+      <p:grpSpPr>
+        <a:xfrm>
+          <a:off x="0" y="0"/>
+          <a:ext cx="0" cy="0"/>
+          <a:chOff x="0" y="0"/>
+          <a:chExt cx="0" cy="0"/>
+        </a:xfrm>
+      </p:grpSpPr>
+      <p:sp>
+        <p:nvSpPr>
+          <p:cNvPr id="2" name="Title 1"/>
+          <p:cNvSpPr>
+            <a:spLocks noGrp="1"/>
+          </p:cNvSpPr>
+          <p:nvPr>
+            <p:ph type="title"/>
           </p:nvPr>
         </p:nvSpPr>
         <p:spPr/>
@@ -3918,25 +4095,705 @@
           <a:p>
             <a:r>
               <a:rPr lang="en-US" dirty="0"/>
+              <a:t>Which of these filenames are good/bad? Why?</a:t>
+            </a:r>
+          </a:p>
+        </p:txBody>
+      </p:sp>
+      <p:sp>
+        <p:nvSpPr>
+          <p:cNvPr id="3" name="Content Placeholder 2"/>
+          <p:cNvSpPr>
+            <a:spLocks noGrp="1"/>
+          </p:cNvSpPr>
+          <p:nvPr>
+            <p:ph idx="1"/>
+          </p:nvPr>
+        </p:nvSpPr>
+        <p:spPr/>
+        <p:txBody>
+          <a:bodyPr>
+            <a:normAutofit/>
+          </a:bodyPr>
+          <a:lstStyle/>
+          <a:p>
+            <a:r>
+              <a:rPr lang="en-US" dirty="0" err="1"/>
+              <a:t>Stuff.R</a:t>
+            </a:r>
+            <a:endParaRPr lang="en-US" dirty="0"/>
+          </a:p>
+          <a:p>
+            <a:r>
+              <a:rPr lang="en-US" dirty="0"/>
+              <a:t>Model1 experiment@site1.R</a:t>
+            </a:r>
+          </a:p>
+          <a:p>
+            <a:r>
+              <a:rPr lang="en-US" dirty="0" err="1"/>
+              <a:t>AdultGPS</a:t>
+            </a:r>
+            <a:r>
+              <a:rPr lang="en-US" dirty="0"/>
+              <a:t> </a:t>
+            </a:r>
+            <a:r>
+              <a:rPr lang="en-US" dirty="0" err="1"/>
+              <a:t>Munge.R</a:t>
+            </a:r>
+            <a:endParaRPr lang="en-US" dirty="0"/>
+          </a:p>
+          <a:p>
+            <a:r>
+              <a:rPr lang="en-US" dirty="0" err="1"/>
+              <a:t>Make_dataframes.R</a:t>
+            </a:r>
+            <a:endParaRPr lang="en-US" dirty="0"/>
+          </a:p>
+          <a:p>
+            <a:r>
+              <a:rPr lang="en-US" dirty="0"/>
+              <a:t>Merge </a:t>
+            </a:r>
+            <a:r>
+              <a:rPr lang="en-US" dirty="0" err="1"/>
+              <a:t>Code.R</a:t>
+            </a:r>
+            <a:endParaRPr lang="en-US" dirty="0"/>
+          </a:p>
+          <a:p>
+            <a:r>
+              <a:rPr lang="en-US" dirty="0" err="1"/>
+              <a:t>Munge.R</a:t>
+            </a:r>
+            <a:endParaRPr lang="en-US" dirty="0"/>
+          </a:p>
+          <a:p>
+            <a:r>
+              <a:rPr lang="en-US" dirty="0"/>
+              <a:t>RatPredation19Jul12_no_treat.R</a:t>
+            </a:r>
+          </a:p>
+          <a:p>
+            <a:r>
+              <a:rPr lang="en-US" dirty="0" err="1"/>
+              <a:t>LunchinatoR.R</a:t>
+            </a:r>
+            <a:endParaRPr lang="en-US" dirty="0"/>
+          </a:p>
+          <a:p>
+            <a:endParaRPr lang="en-US" dirty="0"/>
+          </a:p>
+        </p:txBody>
+      </p:sp>
+    </p:spTree>
+    <p:extLst>
+      <p:ext uri="{BB962C8B-B14F-4D97-AF65-F5344CB8AC3E}">
+        <p14:creationId xmlns:p14="http://schemas.microsoft.com/office/powerpoint/2010/main" val="2811347013"/>
+      </p:ext>
+    </p:extLst>
+  </p:cSld>
+  <p:clrMapOvr>
+    <a:masterClrMapping/>
+  </p:clrMapOvr>
+</p:sld>
+</file>
+
+<file path=ppt/slides/slide15.xml><?xml version="1.0" encoding="utf-8"?>
+<p:sld xmlns:a="http://schemas.openxmlformats.org/drawingml/2006/main" xmlns:r="http://schemas.openxmlformats.org/officeDocument/2006/relationships" xmlns:p="http://schemas.openxmlformats.org/presentationml/2006/main">
+  <p:cSld>
+    <p:bg>
+      <p:bgPr>
+        <a:solidFill>
+          <a:schemeClr val="accent2">
+            <a:lumMod val="40000"/>
+            <a:lumOff val="60000"/>
+          </a:schemeClr>
+        </a:solidFill>
+        <a:effectLst/>
+      </p:bgPr>
+    </p:bg>
+    <p:spTree>
+      <p:nvGrpSpPr>
+        <p:cNvPr id="1" name=""/>
+        <p:cNvGrpSpPr/>
+        <p:nvPr/>
+      </p:nvGrpSpPr>
+      <p:grpSpPr>
+        <a:xfrm>
+          <a:off x="0" y="0"/>
+          <a:ext cx="0" cy="0"/>
+          <a:chOff x="0" y="0"/>
+          <a:chExt cx="0" cy="0"/>
+        </a:xfrm>
+      </p:grpSpPr>
+      <p:sp>
+        <p:nvSpPr>
+          <p:cNvPr id="2" name="Title 1"/>
+          <p:cNvSpPr>
+            <a:spLocks noGrp="1"/>
+          </p:cNvSpPr>
+          <p:nvPr>
+            <p:ph type="title"/>
+          </p:nvPr>
+        </p:nvSpPr>
+        <p:spPr/>
+        <p:txBody>
+          <a:bodyPr/>
+          <a:lstStyle/>
+          <a:p>
+            <a:r>
+              <a:rPr lang="en-US" dirty="0"/>
+              <a:t>3. </a:t>
+            </a:r>
+            <a:r>
+              <a:rPr lang="en-US" dirty="0" err="1"/>
+              <a:t>Styleguide</a:t>
+            </a:r>
+            <a:r>
+              <a:rPr lang="en-US" dirty="0"/>
+              <a:t> – script structure</a:t>
+            </a:r>
+          </a:p>
+        </p:txBody>
+      </p:sp>
+      <p:sp>
+        <p:nvSpPr>
+          <p:cNvPr id="3" name="Content Placeholder 2"/>
+          <p:cNvSpPr>
+            <a:spLocks noGrp="1"/>
+          </p:cNvSpPr>
+          <p:nvPr>
+            <p:ph idx="1"/>
+          </p:nvPr>
+        </p:nvSpPr>
+        <p:spPr/>
+        <p:txBody>
+          <a:bodyPr>
+            <a:normAutofit/>
+          </a:bodyPr>
+          <a:lstStyle/>
+          <a:p>
+            <a:r>
+              <a:rPr lang="en-US" dirty="0"/>
+              <a:t>Start script with a title and description </a:t>
+            </a:r>
+          </a:p>
+          <a:p>
+            <a:r>
+              <a:rPr lang="en-US" dirty="0"/>
+              <a:t>Use commented lines to break up your file into easily readable chunks.</a:t>
+            </a:r>
+          </a:p>
+          <a:p>
+            <a:pPr lvl="1"/>
+            <a:r>
+              <a:rPr lang="en-US" dirty="0"/>
+              <a:t># Read in data </a:t>
+            </a:r>
+          </a:p>
+          <a:p>
+            <a:r>
+              <a:rPr lang="en-US" dirty="0"/>
+              <a:t>If your script uses external packages (libraries), load them all at once at the very beginning of the file. </a:t>
+            </a:r>
+          </a:p>
+        </p:txBody>
+      </p:sp>
+    </p:spTree>
+    <p:extLst>
+      <p:ext uri="{BB962C8B-B14F-4D97-AF65-F5344CB8AC3E}">
+        <p14:creationId xmlns:p14="http://schemas.microsoft.com/office/powerpoint/2010/main" val="398975198"/>
+      </p:ext>
+    </p:extLst>
+  </p:cSld>
+  <p:clrMapOvr>
+    <a:masterClrMapping/>
+  </p:clrMapOvr>
+</p:sld>
+</file>
+
+<file path=ppt/slides/slide16.xml><?xml version="1.0" encoding="utf-8"?>
+<p:sld xmlns:a="http://schemas.openxmlformats.org/drawingml/2006/main" xmlns:r="http://schemas.openxmlformats.org/officeDocument/2006/relationships" xmlns:p="http://schemas.openxmlformats.org/presentationml/2006/main">
+  <p:cSld>
+    <p:bg>
+      <p:bgPr>
+        <a:solidFill>
+          <a:schemeClr val="accent2">
+            <a:lumMod val="40000"/>
+            <a:lumOff val="60000"/>
+          </a:schemeClr>
+        </a:solidFill>
+        <a:effectLst/>
+      </p:bgPr>
+    </p:bg>
+    <p:spTree>
+      <p:nvGrpSpPr>
+        <p:cNvPr id="1" name=""/>
+        <p:cNvGrpSpPr/>
+        <p:nvPr/>
+      </p:nvGrpSpPr>
+      <p:grpSpPr>
+        <a:xfrm>
+          <a:off x="0" y="0"/>
+          <a:ext cx="0" cy="0"/>
+          <a:chOff x="0" y="0"/>
+          <a:chExt cx="0" cy="0"/>
+        </a:xfrm>
+      </p:grpSpPr>
+      <p:sp>
+        <p:nvSpPr>
+          <p:cNvPr id="2" name="Title 1">
+            <a:extLst>
+              <a:ext uri="{FF2B5EF4-FFF2-40B4-BE49-F238E27FC236}">
+                <a16:creationId xmlns:a16="http://schemas.microsoft.com/office/drawing/2014/main" id="{E29A4954-97A3-3246-9F6B-E57D86929D1B}"/>
+              </a:ext>
+            </a:extLst>
+          </p:cNvPr>
+          <p:cNvSpPr>
+            <a:spLocks noGrp="1"/>
+          </p:cNvSpPr>
+          <p:nvPr>
+            <p:ph type="title"/>
+          </p:nvPr>
+        </p:nvSpPr>
+        <p:spPr>
+          <a:xfrm>
+            <a:off x="628650" y="-122554"/>
+            <a:ext cx="7886700" cy="1325563"/>
+          </a:xfrm>
+        </p:spPr>
+        <p:txBody>
+          <a:bodyPr/>
+          <a:lstStyle/>
+          <a:p>
+            <a:r>
+              <a:rPr lang="en-US" dirty="0"/>
+              <a:t>3. </a:t>
+            </a:r>
+            <a:r>
+              <a:rPr lang="en-US" dirty="0" err="1"/>
+              <a:t>Styleguide</a:t>
+            </a:r>
+            <a:r>
+              <a:rPr lang="en-US" dirty="0"/>
+              <a:t> - Outline</a:t>
+            </a:r>
+          </a:p>
+        </p:txBody>
+      </p:sp>
+      <p:sp>
+        <p:nvSpPr>
+          <p:cNvPr id="3" name="Content Placeholder 2">
+            <a:extLst>
+              <a:ext uri="{FF2B5EF4-FFF2-40B4-BE49-F238E27FC236}">
+                <a16:creationId xmlns:a16="http://schemas.microsoft.com/office/drawing/2014/main" id="{AB629F5C-4CAD-874C-ADCE-0087A542B84F}"/>
+              </a:ext>
+            </a:extLst>
+          </p:cNvPr>
+          <p:cNvSpPr>
+            <a:spLocks noGrp="1"/>
+          </p:cNvSpPr>
+          <p:nvPr>
+            <p:ph idx="1"/>
+          </p:nvPr>
+        </p:nvSpPr>
+        <p:spPr>
+          <a:xfrm>
+            <a:off x="451104" y="862457"/>
+            <a:ext cx="8375904" cy="3416935"/>
+          </a:xfrm>
+        </p:spPr>
+        <p:txBody>
+          <a:bodyPr/>
+          <a:lstStyle/>
+          <a:p>
+            <a:r>
+              <a:rPr lang="en-US" dirty="0"/>
+              <a:t>Use four or more dashes after a heading to indicate an outline item</a:t>
+            </a:r>
+          </a:p>
+          <a:p>
+            <a:pPr lvl="1"/>
+            <a:r>
+              <a:rPr lang="en-US" dirty="0"/>
+              <a:t># 1. Explore data -------------------</a:t>
+            </a:r>
+          </a:p>
+          <a:p>
+            <a:r>
+              <a:rPr lang="en-US" dirty="0"/>
+              <a:t>Add additional # signs to create subsections in outline</a:t>
+            </a:r>
+          </a:p>
+          <a:p>
+            <a:pPr lvl="1"/>
+            <a:r>
+              <a:rPr lang="en-US" dirty="0"/>
+              <a:t># 2. Run linear model --------------</a:t>
+            </a:r>
+          </a:p>
+          <a:p>
+            <a:pPr lvl="1"/>
+            <a:r>
+              <a:rPr lang="en-US" dirty="0"/>
+              <a:t>## 2a.  -------------</a:t>
+            </a:r>
+          </a:p>
+          <a:p>
+            <a:pPr lvl="1"/>
+            <a:r>
+              <a:rPr lang="en-US" dirty="0"/>
+              <a:t>###2a.1 -------------</a:t>
+            </a:r>
+          </a:p>
+          <a:p>
+            <a:endParaRPr lang="en-US" dirty="0"/>
+          </a:p>
+        </p:txBody>
+      </p:sp>
+      <p:pic>
+        <p:nvPicPr>
+          <p:cNvPr id="5" name="Picture 4">
+            <a:extLst>
+              <a:ext uri="{FF2B5EF4-FFF2-40B4-BE49-F238E27FC236}">
+                <a16:creationId xmlns:a16="http://schemas.microsoft.com/office/drawing/2014/main" id="{7AD6A4A0-43EA-0E4F-A843-C777A83596BA}"/>
+              </a:ext>
+            </a:extLst>
+          </p:cNvPr>
+          <p:cNvPicPr>
+            <a:picLocks noChangeAspect="1"/>
+          </p:cNvPicPr>
+          <p:nvPr/>
+        </p:nvPicPr>
+        <p:blipFill>
+          <a:blip r:embed="rId2"/>
+          <a:stretch>
+            <a:fillRect/>
+          </a:stretch>
+        </p:blipFill>
+        <p:spPr>
+          <a:xfrm>
+            <a:off x="451104" y="3803986"/>
+            <a:ext cx="8241792" cy="3054014"/>
+          </a:xfrm>
+          <a:prstGeom prst="rect">
+            <a:avLst/>
+          </a:prstGeom>
+        </p:spPr>
+      </p:pic>
+    </p:spTree>
+    <p:extLst>
+      <p:ext uri="{BB962C8B-B14F-4D97-AF65-F5344CB8AC3E}">
+        <p14:creationId xmlns:p14="http://schemas.microsoft.com/office/powerpoint/2010/main" val="3597676824"/>
+      </p:ext>
+    </p:extLst>
+  </p:cSld>
+  <p:clrMapOvr>
+    <a:masterClrMapping/>
+  </p:clrMapOvr>
+</p:sld>
+</file>
+
+<file path=ppt/slides/slide17.xml><?xml version="1.0" encoding="utf-8"?>
+<p:sld xmlns:a="http://schemas.openxmlformats.org/drawingml/2006/main" xmlns:r="http://schemas.openxmlformats.org/officeDocument/2006/relationships" xmlns:p="http://schemas.openxmlformats.org/presentationml/2006/main">
+  <p:cSld>
+    <p:bg>
+      <p:bgPr>
+        <a:solidFill>
+          <a:schemeClr val="accent2">
+            <a:lumMod val="40000"/>
+            <a:lumOff val="60000"/>
+          </a:schemeClr>
+        </a:solidFill>
+        <a:effectLst/>
+      </p:bgPr>
+    </p:bg>
+    <p:spTree>
+      <p:nvGrpSpPr>
+        <p:cNvPr id="1" name=""/>
+        <p:cNvGrpSpPr/>
+        <p:nvPr/>
+      </p:nvGrpSpPr>
+      <p:grpSpPr>
+        <a:xfrm>
+          <a:off x="0" y="0"/>
+          <a:ext cx="0" cy="0"/>
+          <a:chOff x="0" y="0"/>
+          <a:chExt cx="0" cy="0"/>
+        </a:xfrm>
+      </p:grpSpPr>
+      <p:sp>
+        <p:nvSpPr>
+          <p:cNvPr id="2" name="Title 1"/>
+          <p:cNvSpPr>
+            <a:spLocks noGrp="1"/>
+          </p:cNvSpPr>
+          <p:nvPr>
+            <p:ph type="title"/>
+          </p:nvPr>
+        </p:nvSpPr>
+        <p:spPr/>
+        <p:txBody>
+          <a:bodyPr/>
+          <a:lstStyle/>
+          <a:p>
+            <a:r>
+              <a:rPr lang="en-US" dirty="0"/>
+              <a:t>3. </a:t>
+            </a:r>
+            <a:r>
+              <a:rPr lang="en-US" dirty="0" err="1"/>
+              <a:t>Styleguide</a:t>
+            </a:r>
+            <a:r>
+              <a:rPr lang="en-US" dirty="0"/>
+              <a:t> - Syntax</a:t>
+            </a:r>
+          </a:p>
+        </p:txBody>
+      </p:sp>
+      <p:sp>
+        <p:nvSpPr>
+          <p:cNvPr id="3" name="Content Placeholder 2"/>
+          <p:cNvSpPr>
+            <a:spLocks noGrp="1"/>
+          </p:cNvSpPr>
+          <p:nvPr>
+            <p:ph idx="1"/>
+          </p:nvPr>
+        </p:nvSpPr>
+        <p:spPr>
+          <a:xfrm>
+            <a:off x="628650" y="1825624"/>
+            <a:ext cx="7886700" cy="4648327"/>
+          </a:xfrm>
+        </p:spPr>
+        <p:txBody>
+          <a:bodyPr>
+            <a:normAutofit fontScale="92500" lnSpcReduction="10000"/>
+          </a:bodyPr>
+          <a:lstStyle/>
+          <a:p>
+            <a:r>
+              <a:rPr lang="en-US" dirty="0"/>
+              <a:t>Variable and function names should use CamelCase or all lowercase</a:t>
+            </a:r>
+          </a:p>
+          <a:p>
+            <a:r>
+              <a:rPr lang="en-US" dirty="0"/>
+              <a:t>Use underscores (_), aka snake case, to separate words within a name (not a period “.”)</a:t>
+            </a:r>
+          </a:p>
+          <a:p>
+            <a:r>
+              <a:rPr lang="en-US" dirty="0"/>
+              <a:t>Variable names should be nouns and function names should be verbs </a:t>
+            </a:r>
+          </a:p>
+          <a:p>
+            <a:r>
+              <a:rPr lang="en-US" dirty="0"/>
+              <a:t>Be concise when naming</a:t>
+            </a:r>
+          </a:p>
+          <a:p>
+            <a:r>
+              <a:rPr lang="en-US" dirty="0"/>
+              <a:t>Avoid re-using names of common functions and variables (e.g. don’t name any variables or functions “mean”)</a:t>
+            </a:r>
+          </a:p>
+          <a:p>
+            <a:r>
+              <a:rPr lang="en-US" dirty="0"/>
+              <a:t>Prefer TRUE and FALSE over T and F</a:t>
+            </a:r>
+          </a:p>
+        </p:txBody>
+      </p:sp>
+    </p:spTree>
+    <p:extLst>
+      <p:ext uri="{BB962C8B-B14F-4D97-AF65-F5344CB8AC3E}">
+        <p14:creationId xmlns:p14="http://schemas.microsoft.com/office/powerpoint/2010/main" val="150362671"/>
+      </p:ext>
+    </p:extLst>
+  </p:cSld>
+  <p:clrMapOvr>
+    <a:masterClrMapping/>
+  </p:clrMapOvr>
+</p:sld>
+</file>
+
+<file path=ppt/slides/slide18.xml><?xml version="1.0" encoding="utf-8"?>
+<p:sld xmlns:a="http://schemas.openxmlformats.org/drawingml/2006/main" xmlns:r="http://schemas.openxmlformats.org/officeDocument/2006/relationships" xmlns:p="http://schemas.openxmlformats.org/presentationml/2006/main">
+  <p:cSld>
+    <p:bg>
+      <p:bgPr>
+        <a:solidFill>
+          <a:schemeClr val="accent2">
+            <a:lumMod val="40000"/>
+            <a:lumOff val="60000"/>
+          </a:schemeClr>
+        </a:solidFill>
+        <a:effectLst/>
+      </p:bgPr>
+    </p:bg>
+    <p:spTree>
+      <p:nvGrpSpPr>
+        <p:cNvPr id="1" name=""/>
+        <p:cNvGrpSpPr/>
+        <p:nvPr/>
+      </p:nvGrpSpPr>
+      <p:grpSpPr>
+        <a:xfrm>
+          <a:off x="0" y="0"/>
+          <a:ext cx="0" cy="0"/>
+          <a:chOff x="0" y="0"/>
+          <a:chExt cx="0" cy="0"/>
+        </a:xfrm>
+      </p:grpSpPr>
+      <p:sp>
+        <p:nvSpPr>
+          <p:cNvPr id="2" name="Title 1"/>
+          <p:cNvSpPr>
+            <a:spLocks noGrp="1"/>
+          </p:cNvSpPr>
+          <p:nvPr>
+            <p:ph type="title"/>
+          </p:nvPr>
+        </p:nvSpPr>
+        <p:spPr>
+          <a:xfrm>
+            <a:off x="531114" y="157862"/>
+            <a:ext cx="7886700" cy="1325563"/>
+          </a:xfrm>
+        </p:spPr>
+        <p:txBody>
+          <a:bodyPr/>
+          <a:lstStyle/>
+          <a:p>
+            <a:r>
+              <a:rPr lang="en-US" dirty="0"/>
+              <a:t>3. </a:t>
+            </a:r>
+            <a:r>
+              <a:rPr lang="en-US" dirty="0" err="1"/>
+              <a:t>Styleguide</a:t>
+            </a:r>
+            <a:r>
+              <a:rPr lang="en-US" dirty="0"/>
+              <a:t> - spacing</a:t>
+            </a:r>
+          </a:p>
+        </p:txBody>
+      </p:sp>
+      <p:sp>
+        <p:nvSpPr>
+          <p:cNvPr id="3" name="Content Placeholder 2"/>
+          <p:cNvSpPr>
+            <a:spLocks noGrp="1"/>
+          </p:cNvSpPr>
+          <p:nvPr>
+            <p:ph idx="1"/>
+          </p:nvPr>
+        </p:nvSpPr>
+        <p:spPr>
+          <a:xfrm>
+            <a:off x="341376" y="1377696"/>
+            <a:ext cx="8510016" cy="5303519"/>
+          </a:xfrm>
+        </p:spPr>
+        <p:txBody>
+          <a:bodyPr>
+            <a:normAutofit fontScale="92500" lnSpcReduction="10000"/>
+          </a:bodyPr>
+          <a:lstStyle/>
+          <a:p>
+            <a:r>
+              <a:rPr lang="en-US" dirty="0"/>
               <a:t>Most operators (==, +, -, &lt;-, etc.) should be surrounded by spaces. </a:t>
             </a:r>
           </a:p>
           <a:p>
             <a:r>
               <a:rPr lang="en-US" dirty="0"/>
-              <a:t>Put spaces around ~ in double-sided formulas, but omit it in single-sided formulas.</a:t>
-            </a:r>
-          </a:p>
-          <a:p>
-            <a:r>
-              <a:rPr lang="en-US" dirty="0"/>
-              <a:t>Strive to limit your code to 80 characters per line. </a:t>
-            </a:r>
-          </a:p>
-          <a:p>
-            <a:r>
-              <a:rPr lang="en-US" dirty="0"/>
-              <a:t>If a function call is too long to fit on a single line, use one line each for the function name, each argument, and the closing ). This makes the code easier to read and to change later.</a:t>
+              <a:t>Some very important operators (^, $, </a:t>
+            </a:r>
+            <a:r>
+              <a:rPr lang="en-US" dirty="0">
+                <a:sym typeface="Wingdings" pitchFamily="2" charset="2"/>
+              </a:rPr>
+              <a:t>:)</a:t>
+            </a:r>
+            <a:r>
+              <a:rPr lang="en-US" dirty="0"/>
+              <a:t> shouldn’t have a space</a:t>
+            </a:r>
+          </a:p>
+          <a:p>
+            <a:pPr lvl="1"/>
+            <a:r>
+              <a:rPr lang="en-US" dirty="0"/>
+              <a:t>sqrt(x^2 + y^2) </a:t>
+            </a:r>
+          </a:p>
+          <a:p>
+            <a:pPr lvl="1"/>
+            <a:r>
+              <a:rPr lang="en-US" dirty="0" err="1"/>
+              <a:t>df$z</a:t>
+            </a:r>
+            <a:r>
+              <a:rPr lang="en-US" dirty="0"/>
+              <a:t> </a:t>
+            </a:r>
+          </a:p>
+          <a:p>
+            <a:pPr lvl="1"/>
+            <a:r>
+              <a:rPr lang="en-US" dirty="0"/>
+              <a:t>x &lt;- 1:10</a:t>
+            </a:r>
+          </a:p>
+          <a:p>
+            <a:r>
+              <a:rPr lang="en-US" dirty="0"/>
+              <a:t>Put spaces around ~ in double-sided formulas.</a:t>
+            </a:r>
+          </a:p>
+          <a:p>
+            <a:pPr lvl="1"/>
+            <a:r>
+              <a:rPr lang="en-US" dirty="0"/>
+              <a:t>Response ~ predictor</a:t>
+            </a:r>
+          </a:p>
+          <a:p>
+            <a:r>
+              <a:rPr lang="en-US" dirty="0"/>
+              <a:t>Do not place a space before a comma, but always place one after a comma.  </a:t>
+            </a:r>
+            <a:r>
+              <a:rPr lang="en-US" dirty="0" err="1"/>
+              <a:t>lm</a:t>
+            </a:r>
+            <a:r>
+              <a:rPr lang="en-US" dirty="0"/>
+              <a:t>(response ~ predictor, data = test)</a:t>
+            </a:r>
+          </a:p>
+          <a:p>
+            <a:r>
+              <a:rPr lang="en-US" dirty="0"/>
+              <a:t>Do not put spaces inside or outside parentheses for regular function calls</a:t>
+            </a:r>
+          </a:p>
+          <a:p>
+            <a:r>
+              <a:rPr lang="en-US" dirty="0"/>
+              <a:t>Adding extra spaces is ok if it improves alignment of = or &lt;-</a:t>
             </a:r>
           </a:p>
         </p:txBody>
@@ -3945,6 +4802,129 @@
     <p:extLst>
       <p:ext uri="{BB962C8B-B14F-4D97-AF65-F5344CB8AC3E}">
         <p14:creationId xmlns:p14="http://schemas.microsoft.com/office/powerpoint/2010/main" val="2284194431"/>
+      </p:ext>
+    </p:extLst>
+  </p:cSld>
+  <p:clrMapOvr>
+    <a:masterClrMapping/>
+  </p:clrMapOvr>
+</p:sld>
+</file>
+
+<file path=ppt/slides/slide19.xml><?xml version="1.0" encoding="utf-8"?>
+<p:sld xmlns:a="http://schemas.openxmlformats.org/drawingml/2006/main" xmlns:r="http://schemas.openxmlformats.org/officeDocument/2006/relationships" xmlns:p="http://schemas.openxmlformats.org/presentationml/2006/main">
+  <p:cSld>
+    <p:bg>
+      <p:bgPr>
+        <a:solidFill>
+          <a:schemeClr val="accent2">
+            <a:lumMod val="40000"/>
+            <a:lumOff val="60000"/>
+          </a:schemeClr>
+        </a:solidFill>
+        <a:effectLst/>
+      </p:bgPr>
+    </p:bg>
+    <p:spTree>
+      <p:nvGrpSpPr>
+        <p:cNvPr id="1" name=""/>
+        <p:cNvGrpSpPr/>
+        <p:nvPr/>
+      </p:nvGrpSpPr>
+      <p:grpSpPr>
+        <a:xfrm>
+          <a:off x="0" y="0"/>
+          <a:ext cx="0" cy="0"/>
+          <a:chOff x="0" y="0"/>
+          <a:chExt cx="0" cy="0"/>
+        </a:xfrm>
+      </p:grpSpPr>
+      <p:sp>
+        <p:nvSpPr>
+          <p:cNvPr id="2" name="Title 1">
+            <a:extLst>
+              <a:ext uri="{FF2B5EF4-FFF2-40B4-BE49-F238E27FC236}">
+                <a16:creationId xmlns:a16="http://schemas.microsoft.com/office/drawing/2014/main" id="{586DC4BC-9497-D844-9C4E-BDF5C63D01D3}"/>
+              </a:ext>
+            </a:extLst>
+          </p:cNvPr>
+          <p:cNvSpPr>
+            <a:spLocks noGrp="1"/>
+          </p:cNvSpPr>
+          <p:nvPr>
+            <p:ph type="title"/>
+          </p:nvPr>
+        </p:nvSpPr>
+        <p:spPr/>
+        <p:txBody>
+          <a:bodyPr/>
+          <a:lstStyle/>
+          <a:p>
+            <a:r>
+              <a:rPr lang="en-US" dirty="0"/>
+              <a:t>3. Code length</a:t>
+            </a:r>
+          </a:p>
+        </p:txBody>
+      </p:sp>
+      <p:sp>
+        <p:nvSpPr>
+          <p:cNvPr id="3" name="Content Placeholder 2">
+            <a:extLst>
+              <a:ext uri="{FF2B5EF4-FFF2-40B4-BE49-F238E27FC236}">
+                <a16:creationId xmlns:a16="http://schemas.microsoft.com/office/drawing/2014/main" id="{CCE1C6A2-DEA7-C546-9E51-673B252A0E68}"/>
+              </a:ext>
+            </a:extLst>
+          </p:cNvPr>
+          <p:cNvSpPr>
+            <a:spLocks noGrp="1"/>
+          </p:cNvSpPr>
+          <p:nvPr>
+            <p:ph idx="1"/>
+          </p:nvPr>
+        </p:nvSpPr>
+        <p:spPr/>
+        <p:txBody>
+          <a:bodyPr/>
+          <a:lstStyle/>
+          <a:p>
+            <a:r>
+              <a:rPr lang="en-US" dirty="0"/>
+              <a:t>Strive to limit your code to 80 characters per line. </a:t>
+            </a:r>
+          </a:p>
+          <a:p>
+            <a:pPr lvl="1"/>
+            <a:r>
+              <a:rPr lang="en-US" dirty="0"/>
+              <a:t>To add line at 80 characters, go to Preferences </a:t>
+            </a:r>
+            <a:r>
+              <a:rPr lang="en-US" dirty="0">
+                <a:sym typeface="Wingdings" pitchFamily="2" charset="2"/>
+              </a:rPr>
+              <a:t> Code  Display  Show margin column, margin column 80</a:t>
+            </a:r>
+            <a:endParaRPr lang="en-US" dirty="0"/>
+          </a:p>
+          <a:p>
+            <a:r>
+              <a:rPr lang="en-US" dirty="0"/>
+              <a:t>If a function call is too long to fit on a single line, use one line each for the function name, each argument, and the closing ). This makes the code easier to read and to change later.</a:t>
+            </a:r>
+          </a:p>
+          <a:p>
+            <a:endParaRPr lang="en-US" dirty="0"/>
+          </a:p>
+          <a:p>
+            <a:endParaRPr lang="en-US" dirty="0"/>
+          </a:p>
+        </p:txBody>
+      </p:sp>
+    </p:spTree>
+    <p:extLst>
+      <p:ext uri="{BB962C8B-B14F-4D97-AF65-F5344CB8AC3E}">
+        <p14:creationId xmlns:p14="http://schemas.microsoft.com/office/powerpoint/2010/main" val="4035716564"/>
       </p:ext>
     </p:extLst>
   </p:cSld>
@@ -3973,7 +4953,13 @@
       </p:grpSpPr>
       <p:sp>
         <p:nvSpPr>
-          <p:cNvPr id="2" name="Title 1"/>
+          <p:cNvPr id="2" name="Title 1">
+            <a:extLst>
+              <a:ext uri="{FF2B5EF4-FFF2-40B4-BE49-F238E27FC236}">
+                <a16:creationId xmlns:a16="http://schemas.microsoft.com/office/drawing/2014/main" id="{C82A67ED-AEA6-3B4D-9554-0706002B384B}"/>
+              </a:ext>
+            </a:extLst>
+          </p:cNvPr>
           <p:cNvSpPr>
             <a:spLocks noGrp="1"/>
           </p:cNvSpPr>
@@ -3981,26 +4967,27 @@
             <p:ph type="title"/>
           </p:nvPr>
         </p:nvSpPr>
-        <p:spPr>
-          <a:xfrm>
-            <a:off x="457200" y="436098"/>
-            <a:ext cx="8229600" cy="914400"/>
-          </a:xfrm>
-        </p:spPr>
-        <p:txBody>
-          <a:bodyPr/>
-          <a:lstStyle/>
-          <a:p>
-            <a:r>
-              <a:rPr lang="en-US" dirty="0"/>
-              <a:t>Outline</a:t>
-            </a:r>
-          </a:p>
-        </p:txBody>
-      </p:sp>
-      <p:sp>
-        <p:nvSpPr>
-          <p:cNvPr id="3" name="Content Placeholder 2"/>
+        <p:spPr/>
+        <p:txBody>
+          <a:bodyPr/>
+          <a:lstStyle/>
+          <a:p>
+            <a:r>
+              <a:rPr lang="en-US" dirty="0"/>
+              <a:t>GitHub- Course Materials</a:t>
+            </a:r>
+          </a:p>
+        </p:txBody>
+      </p:sp>
+      <p:sp>
+        <p:nvSpPr>
+          <p:cNvPr id="3" name="Content Placeholder 2">
+            <a:extLst>
+              <a:ext uri="{FF2B5EF4-FFF2-40B4-BE49-F238E27FC236}">
+                <a16:creationId xmlns:a16="http://schemas.microsoft.com/office/drawing/2014/main" id="{F32F635F-56AE-3041-8C77-5F6F414B67CD}"/>
+              </a:ext>
+            </a:extLst>
+          </p:cNvPr>
           <p:cNvSpPr>
             <a:spLocks noGrp="1"/>
           </p:cNvSpPr>
@@ -4008,60 +4995,147 @@
             <p:ph idx="1"/>
           </p:nvPr>
         </p:nvSpPr>
-        <p:spPr>
-          <a:xfrm>
-            <a:off x="457200" y="1654678"/>
-            <a:ext cx="8229600" cy="3548644"/>
-          </a:xfrm>
-        </p:spPr>
-        <p:txBody>
-          <a:bodyPr>
-            <a:normAutofit/>
-          </a:bodyPr>
-          <a:lstStyle/>
-          <a:p>
-            <a:pPr marL="514350" indent="-514350">
-              <a:buFont typeface="+mj-lt"/>
-              <a:buAutoNum type="arabicPeriod"/>
-            </a:pPr>
-            <a:r>
-              <a:rPr lang="en-US" dirty="0"/>
-              <a:t>Make great datasheets</a:t>
-            </a:r>
-          </a:p>
-          <a:p>
-            <a:pPr marL="514350" indent="-514350">
-              <a:buFont typeface="+mj-lt"/>
-              <a:buAutoNum type="arabicPeriod"/>
-            </a:pPr>
-            <a:r>
-              <a:rPr lang="en-US" dirty="0"/>
-              <a:t>Make a tidy database</a:t>
-            </a:r>
-          </a:p>
-          <a:p>
-            <a:pPr marL="514350" indent="-514350">
-              <a:buFont typeface="+mj-lt"/>
-              <a:buAutoNum type="arabicPeriod"/>
-            </a:pPr>
-            <a:r>
-              <a:rPr lang="en-US" dirty="0"/>
-              <a:t>Code with style</a:t>
-            </a:r>
-          </a:p>
-          <a:p>
-            <a:pPr marL="514350" indent="-514350">
-              <a:buFont typeface="+mj-lt"/>
-              <a:buAutoNum type="arabicPeriod"/>
-            </a:pPr>
-            <a:endParaRPr lang="en-US" dirty="0"/>
+        <p:spPr/>
+        <p:txBody>
+          <a:bodyPr/>
+          <a:lstStyle/>
+          <a:p>
+            <a:r>
+              <a:rPr lang="en-US" dirty="0"/>
+              <a:t>Start every class by opening “course materials” and  ”Pulling” all new files down. </a:t>
+            </a:r>
+          </a:p>
+          <a:p>
+            <a:r>
+              <a:rPr lang="en-US" dirty="0"/>
+              <a:t>You will never push changes on this Course Materials repo back to GitHub. </a:t>
+            </a:r>
+          </a:p>
+          <a:p>
+            <a:r>
+              <a:rPr lang="en-US" dirty="0"/>
+              <a:t>If you made changes to any files, you can save them with a new name, and put them on your ‘</a:t>
+            </a:r>
+            <a:r>
+              <a:rPr lang="en-US" dirty="0" err="1"/>
+              <a:t>git.ignore</a:t>
+            </a:r>
+            <a:r>
+              <a:rPr lang="en-US" dirty="0"/>
+              <a:t>’ list so they don’t get tracked. </a:t>
+            </a:r>
+          </a:p>
+          <a:p>
+            <a:r>
+              <a:rPr lang="en-US" dirty="0"/>
+              <a:t>End every class by closing the Course Materials project. </a:t>
+            </a:r>
           </a:p>
         </p:txBody>
       </p:sp>
     </p:spTree>
     <p:extLst>
       <p:ext uri="{BB962C8B-B14F-4D97-AF65-F5344CB8AC3E}">
-        <p14:creationId xmlns:p14="http://schemas.microsoft.com/office/powerpoint/2010/main" val="1014671427"/>
+        <p14:creationId xmlns:p14="http://schemas.microsoft.com/office/powerpoint/2010/main" val="1893836131"/>
+      </p:ext>
+    </p:extLst>
+  </p:cSld>
+  <p:clrMapOvr>
+    <a:masterClrMapping/>
+  </p:clrMapOvr>
+</p:sld>
+</file>
+
+<file path=ppt/slides/slide20.xml><?xml version="1.0" encoding="utf-8"?>
+<p:sld xmlns:a="http://schemas.openxmlformats.org/drawingml/2006/main" xmlns:r="http://schemas.openxmlformats.org/officeDocument/2006/relationships" xmlns:p="http://schemas.openxmlformats.org/presentationml/2006/main">
+  <p:cSld>
+    <p:spTree>
+      <p:nvGrpSpPr>
+        <p:cNvPr id="1" name=""/>
+        <p:cNvGrpSpPr/>
+        <p:nvPr/>
+      </p:nvGrpSpPr>
+      <p:grpSpPr>
+        <a:xfrm>
+          <a:off x="0" y="0"/>
+          <a:ext cx="0" cy="0"/>
+          <a:chOff x="0" y="0"/>
+          <a:chExt cx="0" cy="0"/>
+        </a:xfrm>
+      </p:grpSpPr>
+      <p:sp>
+        <p:nvSpPr>
+          <p:cNvPr id="2" name="Title 1">
+            <a:extLst>
+              <a:ext uri="{FF2B5EF4-FFF2-40B4-BE49-F238E27FC236}">
+                <a16:creationId xmlns:a16="http://schemas.microsoft.com/office/drawing/2014/main" id="{6FEEF33D-29C7-624E-9ACB-CC8B2FCF17BF}"/>
+              </a:ext>
+            </a:extLst>
+          </p:cNvPr>
+          <p:cNvSpPr>
+            <a:spLocks noGrp="1"/>
+          </p:cNvSpPr>
+          <p:nvPr>
+            <p:ph type="title"/>
+          </p:nvPr>
+        </p:nvSpPr>
+        <p:spPr/>
+        <p:txBody>
+          <a:bodyPr/>
+          <a:lstStyle/>
+          <a:p>
+            <a:r>
+              <a:rPr lang="en-US" dirty="0"/>
+              <a:t>Wednesday</a:t>
+            </a:r>
+          </a:p>
+        </p:txBody>
+      </p:sp>
+      <p:sp>
+        <p:nvSpPr>
+          <p:cNvPr id="3" name="Content Placeholder 2">
+            <a:extLst>
+              <a:ext uri="{FF2B5EF4-FFF2-40B4-BE49-F238E27FC236}">
+                <a16:creationId xmlns:a16="http://schemas.microsoft.com/office/drawing/2014/main" id="{5112AA32-4004-6E40-94A9-7F7B63BBDC05}"/>
+              </a:ext>
+            </a:extLst>
+          </p:cNvPr>
+          <p:cNvSpPr>
+            <a:spLocks noGrp="1"/>
+          </p:cNvSpPr>
+          <p:nvPr>
+            <p:ph idx="1"/>
+          </p:nvPr>
+        </p:nvSpPr>
+        <p:spPr/>
+        <p:txBody>
+          <a:bodyPr/>
+          <a:lstStyle/>
+          <a:p>
+            <a:r>
+              <a:rPr lang="en-US" dirty="0"/>
+              <a:t>Read the paper by Hadley Wickham on tidy data</a:t>
+            </a:r>
+          </a:p>
+          <a:p>
+            <a:r>
+              <a:rPr lang="en-US" dirty="0"/>
+              <a:t>In class, we will write a data management plan and do an exercise to make a script </a:t>
+            </a:r>
+            <a:r>
+              <a:rPr lang="en-US"/>
+              <a:t>more stylish</a:t>
+            </a:r>
+          </a:p>
+          <a:p>
+            <a:endParaRPr lang="en-US" dirty="0"/>
+          </a:p>
+        </p:txBody>
+      </p:sp>
+    </p:spTree>
+    <p:extLst>
+      <p:ext uri="{BB962C8B-B14F-4D97-AF65-F5344CB8AC3E}">
+        <p14:creationId xmlns:p14="http://schemas.microsoft.com/office/powerpoint/2010/main" val="1273700784"/>
       </p:ext>
     </p:extLst>
   </p:cSld>
@@ -4090,7 +5164,13 @@
       </p:grpSpPr>
       <p:sp>
         <p:nvSpPr>
-          <p:cNvPr id="2" name="Title 1"/>
+          <p:cNvPr id="2" name="Title 1">
+            <a:extLst>
+              <a:ext uri="{FF2B5EF4-FFF2-40B4-BE49-F238E27FC236}">
+                <a16:creationId xmlns:a16="http://schemas.microsoft.com/office/drawing/2014/main" id="{67F15B0B-224E-A54B-944A-7EC5DC04DAFF}"/>
+              </a:ext>
+            </a:extLst>
+          </p:cNvPr>
           <p:cNvSpPr>
             <a:spLocks noGrp="1"/>
           </p:cNvSpPr>
@@ -4105,14 +5185,20 @@
           <a:p>
             <a:r>
               <a:rPr lang="en-US" dirty="0"/>
-              <a:t>1. Designing good datasheets</a:t>
-            </a:r>
-          </a:p>
-        </p:txBody>
-      </p:sp>
-      <p:sp>
-        <p:nvSpPr>
-          <p:cNvPr id="3" name="Content Placeholder 2"/>
+              <a:t>GitHub - Individual Projects</a:t>
+            </a:r>
+          </a:p>
+        </p:txBody>
+      </p:sp>
+      <p:sp>
+        <p:nvSpPr>
+          <p:cNvPr id="3" name="Content Placeholder 2">
+            <a:extLst>
+              <a:ext uri="{FF2B5EF4-FFF2-40B4-BE49-F238E27FC236}">
+                <a16:creationId xmlns:a16="http://schemas.microsoft.com/office/drawing/2014/main" id="{54BC0AB7-7097-4540-A854-B47AD20B3D04}"/>
+              </a:ext>
+            </a:extLst>
+          </p:cNvPr>
           <p:cNvSpPr>
             <a:spLocks noGrp="1"/>
           </p:cNvSpPr>
@@ -4127,21 +5213,19 @@
           <a:p>
             <a:r>
               <a:rPr lang="en-US" dirty="0"/>
-              <a:t>Look at these sample datasheets </a:t>
-            </a:r>
-          </a:p>
-          <a:p>
-            <a:pPr lvl="1"/>
-            <a:r>
-              <a:rPr lang="en-US" dirty="0"/>
-              <a:t>What is good about it? </a:t>
-            </a:r>
-          </a:p>
-          <a:p>
-            <a:pPr lvl="1"/>
-            <a:r>
-              <a:rPr lang="en-US" dirty="0"/>
-              <a:t>What would you change? </a:t>
+              <a:t>Each of you should have your individual projects in GitHub now. </a:t>
+            </a:r>
+          </a:p>
+          <a:p>
+            <a:r>
+              <a:rPr lang="en-US" dirty="0"/>
+              <a:t>Add your homework assignments to the 590A folder</a:t>
+            </a:r>
+          </a:p>
+          <a:p>
+            <a:r>
+              <a:rPr lang="en-US" dirty="0"/>
+              <a:t>You should replace existing files in the folders with your own data, protocol etc. files. </a:t>
             </a:r>
           </a:p>
         </p:txBody>
@@ -4149,7 +5233,7 @@
     </p:spTree>
     <p:extLst>
       <p:ext uri="{BB962C8B-B14F-4D97-AF65-F5344CB8AC3E}">
-        <p14:creationId xmlns:p14="http://schemas.microsoft.com/office/powerpoint/2010/main" val="2945528832"/>
+        <p14:creationId xmlns:p14="http://schemas.microsoft.com/office/powerpoint/2010/main" val="1633169530"/>
       </p:ext>
     </p:extLst>
   </p:cSld>
@@ -4186,100 +5270,93 @@
             <p:ph type="title"/>
           </p:nvPr>
         </p:nvSpPr>
-        <p:spPr/>
-        <p:txBody>
-          <a:bodyPr/>
-          <a:lstStyle/>
-          <a:p>
-            <a:r>
-              <a:rPr lang="en-US" dirty="0"/>
-              <a:t>1. Designing good datasheets</a:t>
-            </a:r>
-          </a:p>
-        </p:txBody>
-      </p:sp>
-      <p:sp>
-        <p:nvSpPr>
-          <p:cNvPr id="3" name="Content Placeholder 2"/>
-          <p:cNvSpPr>
-            <a:spLocks noGrp="1"/>
-          </p:cNvSpPr>
-          <p:nvPr>
-            <p:ph idx="1"/>
-          </p:nvPr>
-        </p:nvSpPr>
         <p:spPr>
           <a:xfrm>
-            <a:off x="628650" y="1590678"/>
-            <a:ext cx="7886700" cy="4765675"/>
+            <a:off x="457200" y="436098"/>
+            <a:ext cx="8229600" cy="914400"/>
           </a:xfrm>
         </p:spPr>
         <p:txBody>
+          <a:bodyPr/>
+          <a:lstStyle/>
+          <a:p>
+            <a:r>
+              <a:rPr lang="en-US" dirty="0"/>
+              <a:t>Outline</a:t>
+            </a:r>
+          </a:p>
+        </p:txBody>
+      </p:sp>
+      <p:sp>
+        <p:nvSpPr>
+          <p:cNvPr id="3" name="Content Placeholder 2"/>
+          <p:cNvSpPr>
+            <a:spLocks noGrp="1"/>
+          </p:cNvSpPr>
+          <p:nvPr>
+            <p:ph idx="1"/>
+          </p:nvPr>
+        </p:nvSpPr>
+        <p:spPr>
+          <a:xfrm>
+            <a:off x="457200" y="1654678"/>
+            <a:ext cx="8229600" cy="3548644"/>
+          </a:xfrm>
+        </p:spPr>
+        <p:txBody>
           <a:bodyPr>
-            <a:normAutofit lnSpcReduction="10000"/>
+            <a:normAutofit/>
           </a:bodyPr>
           <a:lstStyle/>
           <a:p>
-            <a:r>
-              <a:rPr lang="en-US" dirty="0"/>
-              <a:t>Header information – reduces repetition/empty space</a:t>
-            </a:r>
-          </a:p>
-          <a:p>
-            <a:r>
-              <a:rPr lang="en-US" dirty="0"/>
-              <a:t>Organization - what does a row mean? </a:t>
-            </a:r>
-          </a:p>
-          <a:p>
-            <a:pPr lvl="1"/>
-            <a:r>
-              <a:rPr lang="en-US" dirty="0"/>
-              <a:t>"Column variable, row observation"</a:t>
-            </a:r>
-          </a:p>
-          <a:p>
-            <a:r>
-              <a:rPr lang="en-US" dirty="0"/>
-              <a:t>Units of measurement clearly demarcated on datasheet</a:t>
-            </a:r>
-          </a:p>
-          <a:p>
-            <a:r>
-              <a:rPr lang="en-US" dirty="0"/>
-              <a:t>Use consistent codes (guide to codes at bottom)</a:t>
-            </a:r>
-          </a:p>
-          <a:p>
-            <a:r>
-              <a:rPr lang="en-US" dirty="0"/>
-              <a:t>Enough space to record data clearly</a:t>
-            </a:r>
-          </a:p>
-          <a:p>
-            <a:r>
-              <a:rPr lang="en-US" dirty="0"/>
-              <a:t>Room for notes</a:t>
-            </a:r>
-          </a:p>
-          <a:p>
-            <a:r>
-              <a:rPr lang="en-US" dirty="0"/>
-              <a:t>Page numbers (page __ of __)</a:t>
-            </a:r>
-          </a:p>
-          <a:p>
-            <a:r>
-              <a:rPr lang="en-US" dirty="0"/>
-              <a:t>Boxes for “entered, proofed, scanned”</a:t>
-            </a:r>
+            <a:pPr marL="514350" indent="-514350">
+              <a:buFont typeface="+mj-lt"/>
+              <a:buAutoNum type="arabicPeriod"/>
+            </a:pPr>
+            <a:r>
+              <a:rPr lang="en-US" dirty="0"/>
+              <a:t>Make great datasheets</a:t>
+            </a:r>
+          </a:p>
+          <a:p>
+            <a:pPr marL="514350" indent="-514350">
+              <a:buFont typeface="+mj-lt"/>
+              <a:buAutoNum type="arabicPeriod"/>
+            </a:pPr>
+            <a:r>
+              <a:rPr lang="en-US" dirty="0"/>
+              <a:t>Make a tidy database</a:t>
+            </a:r>
+          </a:p>
+          <a:p>
+            <a:pPr marL="514350" indent="-514350">
+              <a:buFont typeface="+mj-lt"/>
+              <a:buAutoNum type="arabicPeriod"/>
+            </a:pPr>
+            <a:r>
+              <a:rPr lang="en-US" dirty="0"/>
+              <a:t>Code with style</a:t>
+            </a:r>
+          </a:p>
+          <a:p>
+            <a:pPr marL="0" indent="0">
+              <a:buNone/>
+            </a:pPr>
+            <a:endParaRPr lang="en-US" dirty="0"/>
+          </a:p>
+          <a:p>
+            <a:pPr marL="514350" indent="-514350">
+              <a:buFont typeface="+mj-lt"/>
+              <a:buAutoNum type="arabicPeriod"/>
+            </a:pPr>
+            <a:endParaRPr lang="en-US" dirty="0"/>
           </a:p>
         </p:txBody>
       </p:sp>
     </p:spTree>
     <p:extLst>
       <p:ext uri="{BB962C8B-B14F-4D97-AF65-F5344CB8AC3E}">
-        <p14:creationId xmlns:p14="http://schemas.microsoft.com/office/powerpoint/2010/main" val="1850004756"/>
+        <p14:creationId xmlns:p14="http://schemas.microsoft.com/office/powerpoint/2010/main" val="1014671427"/>
       </p:ext>
     </p:extLst>
   </p:cSld>
@@ -4292,6 +5369,17 @@
 <file path=ppt/slides/slide5.xml><?xml version="1.0" encoding="utf-8"?>
 <p:sld xmlns:a="http://schemas.openxmlformats.org/drawingml/2006/main" xmlns:r="http://schemas.openxmlformats.org/officeDocument/2006/relationships" xmlns:p="http://schemas.openxmlformats.org/presentationml/2006/main">
   <p:cSld>
+    <p:bg>
+      <p:bgPr>
+        <a:solidFill>
+          <a:schemeClr val="accent5">
+            <a:lumMod val="40000"/>
+            <a:lumOff val="60000"/>
+          </a:schemeClr>
+        </a:solidFill>
+        <a:effectLst/>
+      </p:bgPr>
+    </p:bg>
     <p:spTree>
       <p:nvGrpSpPr>
         <p:cNvPr id="1" name=""/>
@@ -4323,7 +5411,7 @@
           <a:p>
             <a:r>
               <a:rPr lang="en-US" dirty="0"/>
-              <a:t>2. Make a tidy database</a:t>
+              <a:t>1. Designing good datasheets</a:t>
             </a:r>
           </a:p>
         </p:txBody>
@@ -4344,49 +5432,36 @@
           <a:lstStyle/>
           <a:p>
             <a:r>
-              <a:rPr lang="en-US" dirty="0">
-                <a:hlinkClick r:id="rId2"/>
-              </a:rPr>
-              <a:t>Hadley Wickham's Tidy Data</a:t>
-            </a:r>
-            <a:endParaRPr lang="en-US" dirty="0"/>
-          </a:p>
-          <a:p>
-            <a:r>
-              <a:rPr lang="en-US" dirty="0"/>
-              <a:t>In tidy data:</a:t>
+              <a:rPr lang="en-US" dirty="0"/>
+              <a:t>Two datasheets in Course Materials folder or handed out during class</a:t>
+            </a:r>
+          </a:p>
+          <a:p>
+            <a:r>
+              <a:rPr lang="en-US" dirty="0"/>
+              <a:t>Look at these sample datasheets </a:t>
             </a:r>
           </a:p>
           <a:p>
             <a:pPr lvl="1"/>
             <a:r>
               <a:rPr lang="en-US" dirty="0"/>
-              <a:t>Each variable forms a column.</a:t>
+              <a:t>What is good about it? </a:t>
             </a:r>
           </a:p>
           <a:p>
             <a:pPr lvl="1"/>
             <a:r>
               <a:rPr lang="en-US" dirty="0"/>
-              <a:t>Each observation forms a row.</a:t>
-            </a:r>
-          </a:p>
-          <a:p>
-            <a:pPr lvl="1"/>
-            <a:r>
-              <a:rPr lang="en-US" dirty="0"/>
-              <a:t>Each type of observational unit forms a table.</a:t>
-            </a:r>
-          </a:p>
-          <a:p>
-            <a:endParaRPr lang="en-US" dirty="0"/>
+              <a:t>What would you change? </a:t>
+            </a:r>
           </a:p>
         </p:txBody>
       </p:sp>
     </p:spTree>
     <p:extLst>
       <p:ext uri="{BB962C8B-B14F-4D97-AF65-F5344CB8AC3E}">
-        <p14:creationId xmlns:p14="http://schemas.microsoft.com/office/powerpoint/2010/main" val="3793190632"/>
+        <p14:creationId xmlns:p14="http://schemas.microsoft.com/office/powerpoint/2010/main" val="2945528832"/>
       </p:ext>
     </p:extLst>
   </p:cSld>
@@ -4399,6 +5474,17 @@
 <file path=ppt/slides/slide6.xml><?xml version="1.0" encoding="utf-8"?>
 <p:sld xmlns:a="http://schemas.openxmlformats.org/drawingml/2006/main" xmlns:r="http://schemas.openxmlformats.org/officeDocument/2006/relationships" xmlns:p="http://schemas.openxmlformats.org/presentationml/2006/main">
   <p:cSld>
+    <p:bg>
+      <p:bgPr>
+        <a:solidFill>
+          <a:schemeClr val="accent5">
+            <a:lumMod val="40000"/>
+            <a:lumOff val="60000"/>
+          </a:schemeClr>
+        </a:solidFill>
+        <a:effectLst/>
+      </p:bgPr>
+    </p:bg>
     <p:spTree>
       <p:nvGrpSpPr>
         <p:cNvPr id="1" name=""/>
@@ -4430,7 +5516,7 @@
           <a:p>
             <a:r>
               <a:rPr lang="en-US" dirty="0"/>
-              <a:t>Exercise</a:t>
+              <a:t>1. Designing good datasheets</a:t>
             </a:r>
           </a:p>
         </p:txBody>
@@ -4445,70 +5531,78 @@
             <p:ph idx="1"/>
           </p:nvPr>
         </p:nvSpPr>
-        <p:spPr/>
-        <p:txBody>
-          <a:bodyPr/>
-          <a:lstStyle/>
-          <a:p>
-            <a:r>
-              <a:rPr lang="en-US" dirty="0"/>
-              <a:t>Part 1</a:t>
+        <p:spPr>
+          <a:xfrm>
+            <a:off x="628650" y="1590678"/>
+            <a:ext cx="7886700" cy="4765675"/>
+          </a:xfrm>
+        </p:spPr>
+        <p:txBody>
+          <a:bodyPr>
+            <a:normAutofit lnSpcReduction="10000"/>
+          </a:bodyPr>
+          <a:lstStyle/>
+          <a:p>
+            <a:r>
+              <a:rPr lang="en-US" dirty="0"/>
+              <a:t>Header information – reduces repetition/empty space</a:t>
+            </a:r>
+          </a:p>
+          <a:p>
+            <a:r>
+              <a:rPr lang="en-US" dirty="0"/>
+              <a:t>Organization - what does a row mean? </a:t>
             </a:r>
           </a:p>
           <a:p>
             <a:pPr lvl="1"/>
             <a:r>
               <a:rPr lang="en-US" dirty="0"/>
-              <a:t>Look at  </a:t>
-            </a:r>
-            <a:r>
-              <a:rPr lang="en-US" dirty="0" err="1"/>
-              <a:t>transplant_raw.csv</a:t>
-            </a:r>
-            <a:endParaRPr lang="en-US" dirty="0"/>
-          </a:p>
-          <a:p>
-            <a:pPr lvl="1"/>
-            <a:r>
-              <a:rPr lang="en-US" dirty="0"/>
-              <a:t>What would you change in this database?</a:t>
-            </a:r>
-          </a:p>
-          <a:p>
-            <a:endParaRPr lang="en-US" dirty="0"/>
-          </a:p>
-          <a:p>
-            <a:r>
-              <a:rPr lang="en-US" dirty="0"/>
-              <a:t>Part 2</a:t>
-            </a:r>
-          </a:p>
-          <a:p>
-            <a:pPr lvl="1"/>
-            <a:r>
-              <a:rPr lang="en-US" dirty="0"/>
-              <a:t>Open up your own database</a:t>
-            </a:r>
-          </a:p>
-          <a:p>
-            <a:pPr lvl="1"/>
-            <a:r>
-              <a:rPr lang="en-US" dirty="0"/>
-              <a:t>What would you change in your database? </a:t>
-            </a:r>
-          </a:p>
-          <a:p>
-            <a:endParaRPr lang="en-US" dirty="0"/>
-          </a:p>
-          <a:p>
-            <a:endParaRPr lang="en-US" dirty="0"/>
+              <a:t>"Column variable, row observation"</a:t>
+            </a:r>
+          </a:p>
+          <a:p>
+            <a:r>
+              <a:rPr lang="en-US" dirty="0"/>
+              <a:t>Units of measurement clearly demarcated on datasheet</a:t>
+            </a:r>
+          </a:p>
+          <a:p>
+            <a:r>
+              <a:rPr lang="en-US" dirty="0"/>
+              <a:t>Use consistent codes (guide to codes at bottom)</a:t>
+            </a:r>
+          </a:p>
+          <a:p>
+            <a:r>
+              <a:rPr lang="en-US" dirty="0"/>
+              <a:t>Enough space to record data clearly</a:t>
+            </a:r>
+          </a:p>
+          <a:p>
+            <a:r>
+              <a:rPr lang="en-US" dirty="0"/>
+              <a:t>Room for notes</a:t>
+            </a:r>
+          </a:p>
+          <a:p>
+            <a:r>
+              <a:rPr lang="en-US" dirty="0"/>
+              <a:t>Page numbers (page __ of __)</a:t>
+            </a:r>
+          </a:p>
+          <a:p>
+            <a:r>
+              <a:rPr lang="en-US" dirty="0"/>
+              <a:t>Boxes for “entered, proofed, scanned”</a:t>
+            </a:r>
           </a:p>
         </p:txBody>
       </p:sp>
     </p:spTree>
     <p:extLst>
       <p:ext uri="{BB962C8B-B14F-4D97-AF65-F5344CB8AC3E}">
-        <p14:creationId xmlns:p14="http://schemas.microsoft.com/office/powerpoint/2010/main" val="587847242"/>
+        <p14:creationId xmlns:p14="http://schemas.microsoft.com/office/powerpoint/2010/main" val="1850004756"/>
       </p:ext>
     </p:extLst>
   </p:cSld>
@@ -4521,6 +5615,17 @@
 <file path=ppt/slides/slide7.xml><?xml version="1.0" encoding="utf-8"?>
 <p:sld xmlns:a="http://schemas.openxmlformats.org/drawingml/2006/main" xmlns:r="http://schemas.openxmlformats.org/officeDocument/2006/relationships" xmlns:p="http://schemas.openxmlformats.org/presentationml/2006/main">
   <p:cSld>
+    <p:bg>
+      <p:bgPr>
+        <a:solidFill>
+          <a:schemeClr val="accent6">
+            <a:lumMod val="40000"/>
+            <a:lumOff val="60000"/>
+          </a:schemeClr>
+        </a:solidFill>
+        <a:effectLst/>
+      </p:bgPr>
+    </p:bg>
     <p:spTree>
       <p:nvGrpSpPr>
         <p:cNvPr id="1" name=""/>
@@ -4537,7 +5642,13 @@
       </p:grpSpPr>
       <p:sp>
         <p:nvSpPr>
-          <p:cNvPr id="2" name="Title 1"/>
+          <p:cNvPr id="2" name="Title 1">
+            <a:extLst>
+              <a:ext uri="{FF2B5EF4-FFF2-40B4-BE49-F238E27FC236}">
+                <a16:creationId xmlns:a16="http://schemas.microsoft.com/office/drawing/2014/main" id="{B942D406-EA55-5E41-B132-97E69A14D403}"/>
+              </a:ext>
+            </a:extLst>
+          </p:cNvPr>
           <p:cNvSpPr>
             <a:spLocks noGrp="1"/>
           </p:cNvSpPr>
@@ -4545,12 +5656,7 @@
             <p:ph type="title"/>
           </p:nvPr>
         </p:nvSpPr>
-        <p:spPr>
-          <a:xfrm>
-            <a:off x="457200" y="-76314"/>
-            <a:ext cx="8229600" cy="1143000"/>
-          </a:xfrm>
-        </p:spPr>
+        <p:spPr/>
         <p:txBody>
           <a:bodyPr/>
           <a:lstStyle/>
@@ -4564,7 +5670,13 @@
       </p:sp>
       <p:sp>
         <p:nvSpPr>
-          <p:cNvPr id="3" name="Content Placeholder 2"/>
+          <p:cNvPr id="3" name="Content Placeholder 2">
+            <a:extLst>
+              <a:ext uri="{FF2B5EF4-FFF2-40B4-BE49-F238E27FC236}">
+                <a16:creationId xmlns:a16="http://schemas.microsoft.com/office/drawing/2014/main" id="{CFC889CE-CE26-3244-BD6D-1974C9DA6C6A}"/>
+              </a:ext>
+            </a:extLst>
+          </p:cNvPr>
           <p:cNvSpPr>
             <a:spLocks noGrp="1"/>
           </p:cNvSpPr>
@@ -4572,131 +5684,49 @@
             <p:ph idx="1"/>
           </p:nvPr>
         </p:nvSpPr>
-        <p:spPr>
-          <a:xfrm>
-            <a:off x="457200" y="1066688"/>
-            <a:ext cx="8229600" cy="5634643"/>
-          </a:xfrm>
-        </p:spPr>
-        <p:txBody>
-          <a:bodyPr>
-            <a:normAutofit fontScale="92500" lnSpcReduction="20000"/>
-          </a:bodyPr>
-          <a:lstStyle/>
-          <a:p>
-            <a:pPr marL="514350" indent="-514350">
-              <a:buFont typeface="+mj-lt"/>
-              <a:buAutoNum type="arabicPeriod"/>
-            </a:pPr>
-            <a:r>
-              <a:rPr lang="en-US" dirty="0"/>
-              <a:t>Name columns with R in mind</a:t>
-            </a:r>
-          </a:p>
-          <a:p>
-            <a:pPr marL="514350" indent="-514350">
-              <a:buFont typeface="+mj-lt"/>
-              <a:buAutoNum type="arabicPeriod"/>
-            </a:pPr>
-            <a:r>
-              <a:rPr lang="en-US" dirty="0"/>
-              <a:t>Use consistent codes (if Excel, consider data validation)</a:t>
-            </a:r>
-          </a:p>
-          <a:p>
-            <a:pPr marL="514350" indent="-514350">
-              <a:buFont typeface="+mj-lt"/>
-              <a:buAutoNum type="arabicPeriod"/>
-            </a:pPr>
-            <a:r>
-              <a:rPr lang="en-US" dirty="0"/>
-              <a:t>Remember, case matters in R (upper </a:t>
-            </a:r>
-            <a:r>
-              <a:rPr lang="en-US" dirty="0" err="1"/>
-              <a:t>vs</a:t>
-            </a:r>
-            <a:r>
-              <a:rPr lang="en-US" dirty="0"/>
-              <a:t> lower)</a:t>
-            </a:r>
-          </a:p>
-          <a:p>
-            <a:pPr marL="514350" indent="-514350">
-              <a:buFont typeface="+mj-lt"/>
-              <a:buAutoNum type="arabicPeriod"/>
-            </a:pPr>
-            <a:r>
-              <a:rPr lang="en-US" dirty="0"/>
-              <a:t>Store with appropriate date/time formats</a:t>
-            </a:r>
-          </a:p>
-          <a:p>
-            <a:pPr marL="514350" indent="-514350">
-              <a:buFont typeface="+mj-lt"/>
-              <a:buAutoNum type="arabicPeriod"/>
-            </a:pPr>
-            <a:r>
-              <a:rPr lang="en-US" dirty="0"/>
-              <a:t>Identify estimated data (should not be entered in a manner identical to measured data)</a:t>
-            </a:r>
-          </a:p>
-          <a:p>
-            <a:pPr marL="514350" indent="-514350">
-              <a:buFont typeface="+mj-lt"/>
-              <a:buAutoNum type="arabicPeriod"/>
-            </a:pPr>
-            <a:r>
-              <a:rPr lang="en-US" dirty="0"/>
-              <a:t>Identify missing values and define missing value codes; make sure true zeros are distinguished from missing data. </a:t>
-            </a:r>
-          </a:p>
-          <a:p>
-            <a:pPr marL="514350" indent="-514350">
-              <a:buFont typeface="+mj-lt"/>
-              <a:buAutoNum type="arabicPeriod"/>
-            </a:pPr>
-            <a:r>
-              <a:rPr lang="en-US" dirty="0"/>
-              <a:t>Separate data from notes</a:t>
-            </a:r>
-          </a:p>
-          <a:p>
-            <a:pPr marL="514350" indent="-514350">
-              <a:buFont typeface="+mj-lt"/>
-              <a:buAutoNum type="arabicPeriod"/>
-            </a:pPr>
-            <a:r>
-              <a:rPr lang="en-US" dirty="0"/>
-              <a:t>Use R-safe delimiters (avoid commas within a cell, symbols)</a:t>
-            </a:r>
-          </a:p>
-          <a:p>
-            <a:pPr marL="914400" lvl="1" indent="-514350">
-              <a:buFont typeface="+mj-lt"/>
-              <a:buAutoNum type="arabicPeriod"/>
-            </a:pPr>
-            <a:r>
-              <a:rPr lang="en-US" dirty="0"/>
-              <a:t>Avoid using delimiters that also occur in the data fields or avoid putting delimiters in data field. </a:t>
-            </a:r>
-          </a:p>
-          <a:p>
-            <a:pPr marL="914400" lvl="1" indent="-514350">
-              <a:buFont typeface="+mj-lt"/>
-              <a:buAutoNum type="arabicPeriod"/>
-            </a:pPr>
-            <a:r>
-              <a:rPr lang="en-US" dirty="0"/>
-              <a:t>If this cannot be avoided, enclose data fields that also contain a delimiter in single or double quotes.</a:t>
-            </a:r>
+        <p:spPr/>
+        <p:txBody>
+          <a:bodyPr/>
+          <a:lstStyle/>
+          <a:p>
+            <a:r>
+              <a:rPr lang="en-US" dirty="0"/>
+              <a:t>Look at these sample databases </a:t>
+            </a:r>
+          </a:p>
+          <a:p>
+            <a:pPr lvl="1"/>
+            <a:r>
+              <a:rPr lang="en-US" dirty="0"/>
+              <a:t>What is good about each? </a:t>
+            </a:r>
+          </a:p>
+          <a:p>
+            <a:pPr lvl="1"/>
+            <a:r>
+              <a:rPr lang="en-US" dirty="0"/>
+              <a:t>What would you change?</a:t>
+            </a:r>
+          </a:p>
+          <a:p>
+            <a:pPr lvl="1"/>
+            <a:endParaRPr lang="en-US" dirty="0"/>
+          </a:p>
+          <a:p>
+            <a:r>
+              <a:rPr lang="en-US" dirty="0"/>
+              <a:t>Now make your own “untidy” database. Add every annoying thing you’ve ever seen in a database structure.  </a:t>
+            </a:r>
+          </a:p>
+          <a:p>
+            <a:endParaRPr lang="en-US" dirty="0"/>
           </a:p>
         </p:txBody>
       </p:sp>
     </p:spTree>
     <p:extLst>
       <p:ext uri="{BB962C8B-B14F-4D97-AF65-F5344CB8AC3E}">
-        <p14:creationId xmlns:p14="http://schemas.microsoft.com/office/powerpoint/2010/main" val="1741981114"/>
+        <p14:creationId xmlns:p14="http://schemas.microsoft.com/office/powerpoint/2010/main" val="686921880"/>
       </p:ext>
     </p:extLst>
   </p:cSld>
@@ -4709,6 +5739,17 @@
 <file path=ppt/slides/slide8.xml><?xml version="1.0" encoding="utf-8"?>
 <p:sld xmlns:a="http://schemas.openxmlformats.org/drawingml/2006/main" xmlns:r="http://schemas.openxmlformats.org/officeDocument/2006/relationships" xmlns:p="http://schemas.openxmlformats.org/presentationml/2006/main">
   <p:cSld>
+    <p:bg>
+      <p:bgPr>
+        <a:solidFill>
+          <a:schemeClr val="accent6">
+            <a:lumMod val="40000"/>
+            <a:lumOff val="60000"/>
+          </a:schemeClr>
+        </a:solidFill>
+        <a:effectLst/>
+      </p:bgPr>
+    </p:bg>
     <p:spTree>
       <p:nvGrpSpPr>
         <p:cNvPr id="1" name=""/>
@@ -4740,7 +5781,7 @@
           <a:p>
             <a:r>
               <a:rPr lang="en-US" dirty="0"/>
-              <a:t>3. Code with style</a:t>
+              <a:t>2. Make a tidy database</a:t>
             </a:r>
           </a:p>
         </p:txBody>
@@ -4755,116 +5796,44 @@
             <p:ph idx="1"/>
           </p:nvPr>
         </p:nvSpPr>
-        <p:spPr>
-          <a:xfrm>
-            <a:off x="457200" y="1600200"/>
-            <a:ext cx="8229600" cy="4953000"/>
-          </a:xfrm>
-        </p:spPr>
-        <p:txBody>
-          <a:bodyPr>
-            <a:normAutofit/>
-          </a:bodyPr>
-          <a:lstStyle/>
-          <a:p>
-            <a:pPr marL="0" indent="0" algn="ctr">
-              <a:buNone/>
-            </a:pPr>
-            <a:r>
-              <a:rPr lang="en-US" dirty="0"/>
-              <a:t>Style is important so YOU and OTHERS can read your code and actually use it</a:t>
-            </a:r>
-          </a:p>
-          <a:p>
-            <a:pPr marL="0" indent="0">
-              <a:buNone/>
-            </a:pPr>
-            <a:endParaRPr lang="en-US" dirty="0"/>
-          </a:p>
+        <p:spPr/>
+        <p:txBody>
+          <a:bodyPr/>
+          <a:lstStyle/>
           <a:p>
             <a:r>
               <a:rPr lang="en-US" dirty="0">
                 <a:hlinkClick r:id="rId2"/>
               </a:rPr>
-              <a:t>Tidyverse Style Guide</a:t>
+              <a:t>Hadley Wickham's Tidy Data</a:t>
             </a:r>
             <a:endParaRPr lang="en-US" dirty="0"/>
           </a:p>
           <a:p>
             <a:r>
-              <a:rPr lang="en-US" dirty="0">
-                <a:hlinkClick r:id="rId3">
-                  <a:extLst>
-                    <a:ext uri="{A12FA001-AC4F-418D-AE19-62706E023703}">
-                      <ahyp:hlinkClr xmlns:ahyp="http://schemas.microsoft.com/office/drawing/2018/hyperlinkcolor" val="tx"/>
-                    </a:ext>
-                  </a:extLst>
-                </a:hlinkClick>
-              </a:rPr>
-              <a:t>Hadley Wickham's style guide</a:t>
-            </a:r>
-            <a:endParaRPr lang="en-US" dirty="0">
-              <a:hlinkClick r:id="rId4">
-                <a:extLst>
-                  <a:ext uri="{A12FA001-AC4F-418D-AE19-62706E023703}">
-                    <ahyp:hlinkClr xmlns:ahyp="http://schemas.microsoft.com/office/drawing/2018/hyperlinkcolor" val="tx"/>
-                  </a:ext>
-                </a:extLst>
-              </a:hlinkClick>
-            </a:endParaRPr>
-          </a:p>
-          <a:p>
-            <a:r>
-              <a:rPr lang="en-US" dirty="0">
-                <a:hlinkClick r:id="rId4">
-                  <a:extLst>
-                    <a:ext uri="{A12FA001-AC4F-418D-AE19-62706E023703}">
-                      <ahyp:hlinkClr xmlns:ahyp="http://schemas.microsoft.com/office/drawing/2018/hyperlinkcolor" val="tx"/>
-                    </a:ext>
-                  </a:extLst>
-                </a:hlinkClick>
-              </a:rPr>
-              <a:t>Google style guide</a:t>
-            </a:r>
-            <a:endParaRPr lang="en-US" dirty="0"/>
-          </a:p>
-          <a:p>
-            <a:r>
-              <a:rPr lang="en-US" dirty="0">
-                <a:hlinkClick r:id="rId5">
-                  <a:extLst>
-                    <a:ext uri="{A12FA001-AC4F-418D-AE19-62706E023703}">
-                      <ahyp:hlinkClr xmlns:ahyp="http://schemas.microsoft.com/office/drawing/2018/hyperlinkcolor" val="tx"/>
-                    </a:ext>
-                  </a:extLst>
-                </a:hlinkClick>
-              </a:rPr>
-              <a:t>Condensed version of Google/Hadley guide</a:t>
-            </a:r>
-            <a:endParaRPr lang="en-US" dirty="0"/>
-          </a:p>
-          <a:p>
-            <a:r>
-              <a:rPr lang="en-US" dirty="0">
-                <a:hlinkClick r:id="rId6">
-                  <a:extLst>
-                    <a:ext uri="{A12FA001-AC4F-418D-AE19-62706E023703}">
-                      <ahyp:hlinkClr xmlns:ahyp="http://schemas.microsoft.com/office/drawing/2018/hyperlinkcolor" val="tx"/>
-                    </a:ext>
-                  </a:extLst>
-                </a:hlinkClick>
-              </a:rPr>
-              <a:t>Henrik Bengtsson style guide</a:t>
-            </a:r>
-            <a:endParaRPr lang="en-US" dirty="0"/>
-          </a:p>
-          <a:p>
-            <a:endParaRPr lang="en-US" dirty="0"/>
-          </a:p>
-          <a:p>
-            <a:r>
-              <a:rPr lang="en-US" dirty="0"/>
-              <a:t>R Studio- Preferences - Diagnostics</a:t>
+              <a:rPr lang="en-US" dirty="0"/>
+              <a:t>In tidy data:</a:t>
+            </a:r>
+          </a:p>
+          <a:p>
+            <a:pPr lvl="1"/>
+            <a:r>
+              <a:rPr lang="en-US" dirty="0"/>
+              <a:t>Each variable forms a column.</a:t>
+            </a:r>
+          </a:p>
+          <a:p>
+            <a:pPr lvl="1"/>
+            <a:r>
+              <a:rPr lang="en-US" dirty="0"/>
+              <a:t>Each observation forms a row.</a:t>
+            </a:r>
+          </a:p>
+          <a:p>
+            <a:pPr lvl="1"/>
+            <a:r>
+              <a:rPr lang="en-US" dirty="0"/>
+              <a:t>Each type of observational unit forms a table.</a:t>
             </a:r>
           </a:p>
           <a:p>
@@ -4875,7 +5844,7 @@
     </p:spTree>
     <p:extLst>
       <p:ext uri="{BB962C8B-B14F-4D97-AF65-F5344CB8AC3E}">
-        <p14:creationId xmlns:p14="http://schemas.microsoft.com/office/powerpoint/2010/main" val="254822252"/>
+        <p14:creationId xmlns:p14="http://schemas.microsoft.com/office/powerpoint/2010/main" val="3793190632"/>
       </p:ext>
     </p:extLst>
   </p:cSld>
@@ -4888,6 +5857,17 @@
 <file path=ppt/slides/slide9.xml><?xml version="1.0" encoding="utf-8"?>
 <p:sld xmlns:a="http://schemas.openxmlformats.org/drawingml/2006/main" xmlns:r="http://schemas.openxmlformats.org/officeDocument/2006/relationships" xmlns:p="http://schemas.openxmlformats.org/presentationml/2006/main">
   <p:cSld>
+    <p:bg>
+      <p:bgPr>
+        <a:solidFill>
+          <a:schemeClr val="accent6">
+            <a:lumMod val="40000"/>
+            <a:lumOff val="60000"/>
+          </a:schemeClr>
+        </a:solidFill>
+        <a:effectLst/>
+      </p:bgPr>
+    </p:bg>
     <p:spTree>
       <p:nvGrpSpPr>
         <p:cNvPr id="1" name=""/>
@@ -4912,22 +5892,19 @@
             <p:ph type="title"/>
           </p:nvPr>
         </p:nvSpPr>
-        <p:spPr/>
-        <p:txBody>
-          <a:bodyPr/>
-          <a:lstStyle/>
-          <a:p>
-            <a:r>
-              <a:rPr lang="en-US" dirty="0"/>
-              <a:t>3. </a:t>
-            </a:r>
-            <a:r>
-              <a:rPr lang="en-US" dirty="0" err="1"/>
-              <a:t>Styleguide</a:t>
-            </a:r>
-            <a:r>
-              <a:rPr lang="en-US" dirty="0"/>
-              <a:t>: Filenames</a:t>
+        <p:spPr>
+          <a:xfrm>
+            <a:off x="457200" y="-76314"/>
+            <a:ext cx="8229600" cy="1143000"/>
+          </a:xfrm>
+        </p:spPr>
+        <p:txBody>
+          <a:bodyPr/>
+          <a:lstStyle/>
+          <a:p>
+            <a:r>
+              <a:rPr lang="en-US" dirty="0"/>
+              <a:t>2. Make a tidy database</a:t>
             </a:r>
           </a:p>
         </p:txBody>
@@ -4942,38 +5919,65 @@
             <p:ph idx="1"/>
           </p:nvPr>
         </p:nvSpPr>
-        <p:spPr/>
-        <p:txBody>
-          <a:bodyPr/>
-          <a:lstStyle/>
-          <a:p>
-            <a:r>
-              <a:rPr lang="en-US" dirty="0"/>
-              <a:t>Make meaningful filenames</a:t>
-            </a:r>
-          </a:p>
-          <a:p>
-            <a:r>
-              <a:rPr lang="en-US" dirty="0"/>
-              <a:t>Use _ to separate words</a:t>
-            </a:r>
-          </a:p>
-          <a:p>
-            <a:r>
-              <a:rPr lang="en-US" dirty="0"/>
-              <a:t>Do not use spaces or special characters (only #’s, letters, -, and _). </a:t>
-            </a:r>
-          </a:p>
-          <a:p>
-            <a:r>
-              <a:rPr lang="en-US" dirty="0"/>
-              <a:t>Lower-case not capitalized</a:t>
-            </a:r>
-          </a:p>
-          <a:p>
-            <a:r>
-              <a:rPr lang="en-US" dirty="0"/>
-              <a:t>If need to be run in a particular order, name them starting with 01, 02, 03 etc. </a:t>
+        <p:spPr>
+          <a:xfrm>
+            <a:off x="457200" y="1066688"/>
+            <a:ext cx="8229600" cy="5634643"/>
+          </a:xfrm>
+        </p:spPr>
+        <p:txBody>
+          <a:bodyPr>
+            <a:normAutofit fontScale="92500" lnSpcReduction="10000"/>
+          </a:bodyPr>
+          <a:lstStyle/>
+          <a:p>
+            <a:r>
+              <a:rPr lang="en-US" dirty="0"/>
+              <a:t>Name columns with R in mind (avoid all punctuation/symbols/spaces)</a:t>
+            </a:r>
+          </a:p>
+          <a:p>
+            <a:r>
+              <a:rPr lang="en-US" dirty="0"/>
+              <a:t>Use consistent names/codes (if Excel, consider data validation)</a:t>
+            </a:r>
+          </a:p>
+          <a:p>
+            <a:r>
+              <a:rPr lang="en-US" dirty="0"/>
+              <a:t>Case matters in R (upper vs lower), so pick one</a:t>
+            </a:r>
+          </a:p>
+          <a:p>
+            <a:r>
+              <a:rPr lang="en-US" dirty="0"/>
+              <a:t>Store with appropriate date/time formats (R default is YYYY-MM-DD)</a:t>
+            </a:r>
+          </a:p>
+          <a:p>
+            <a:r>
+              <a:rPr lang="en-US" dirty="0"/>
+              <a:t>Identify missing values and define missing value codes; make sure true zeros are distinguished from missing data. </a:t>
+            </a:r>
+          </a:p>
+          <a:p>
+            <a:r>
+              <a:rPr lang="en-US" dirty="0"/>
+              <a:t>Use R-safe delimiters (avoid commas within a cell, symbols)</a:t>
+            </a:r>
+          </a:p>
+          <a:p>
+            <a:pPr marL="914400" lvl="1" indent="-514350"/>
+            <a:r>
+              <a:rPr lang="en-US" dirty="0"/>
+              <a:t>Avoid using delimiters that also occur in the data fields or avoid putting delimiters in data field. </a:t>
+            </a:r>
+          </a:p>
+          <a:p>
+            <a:pPr marL="914400" lvl="1" indent="-514350"/>
+            <a:r>
+              <a:rPr lang="en-US" dirty="0"/>
+              <a:t>If this cannot be avoided, enclose data fields that also contain a delimiter in single or double quotes.</a:t>
             </a:r>
           </a:p>
         </p:txBody>
@@ -4981,7 +5985,7 @@
     </p:spTree>
     <p:extLst>
       <p:ext uri="{BB962C8B-B14F-4D97-AF65-F5344CB8AC3E}">
-        <p14:creationId xmlns:p14="http://schemas.microsoft.com/office/powerpoint/2010/main" val="3609313730"/>
+        <p14:creationId xmlns:p14="http://schemas.microsoft.com/office/powerpoint/2010/main" val="1741981114"/>
       </p:ext>
     </p:extLst>
   </p:cSld>

</xml_diff>

<commit_message>
updated ppt for class
</commit_message>
<xml_diff>
--- a/2. Data Management/Wk4 - Datasheets and Coding with Style.pptx
+++ b/2. Data Management/Wk4 - Datasheets and Coding with Style.pptx
@@ -216,7 +216,7 @@
           <a:p>
             <a:fld id="{24D835DA-F873-4441-A9ED-91E9C627787D}" type="datetimeFigureOut">
               <a:rPr lang="en-US" smtClean="0"/>
-              <a:t>9/13/21</a:t>
+              <a:t>9/15/21</a:t>
             </a:fld>
             <a:endParaRPr lang="en-US"/>
           </a:p>
@@ -698,7 +698,7 @@
           <a:p>
             <a:fld id="{D17AE834-0754-0944-8EF4-349530BA008F}" type="datetimeFigureOut">
               <a:rPr lang="en-US" smtClean="0"/>
-              <a:t>9/13/21</a:t>
+              <a:t>9/15/21</a:t>
             </a:fld>
             <a:endParaRPr lang="en-US"/>
           </a:p>
@@ -868,7 +868,7 @@
           <a:p>
             <a:fld id="{D17AE834-0754-0944-8EF4-349530BA008F}" type="datetimeFigureOut">
               <a:rPr lang="en-US" smtClean="0"/>
-              <a:t>9/13/21</a:t>
+              <a:t>9/15/21</a:t>
             </a:fld>
             <a:endParaRPr lang="en-US"/>
           </a:p>
@@ -1048,7 +1048,7 @@
           <a:p>
             <a:fld id="{D17AE834-0754-0944-8EF4-349530BA008F}" type="datetimeFigureOut">
               <a:rPr lang="en-US" smtClean="0"/>
-              <a:t>9/13/21</a:t>
+              <a:t>9/15/21</a:t>
             </a:fld>
             <a:endParaRPr lang="en-US"/>
           </a:p>
@@ -1218,7 +1218,7 @@
           <a:p>
             <a:fld id="{D17AE834-0754-0944-8EF4-349530BA008F}" type="datetimeFigureOut">
               <a:rPr lang="en-US" smtClean="0"/>
-              <a:t>9/13/21</a:t>
+              <a:t>9/15/21</a:t>
             </a:fld>
             <a:endParaRPr lang="en-US"/>
           </a:p>
@@ -1462,7 +1462,7 @@
           <a:p>
             <a:fld id="{D17AE834-0754-0944-8EF4-349530BA008F}" type="datetimeFigureOut">
               <a:rPr lang="en-US" smtClean="0"/>
-              <a:t>9/13/21</a:t>
+              <a:t>9/15/21</a:t>
             </a:fld>
             <a:endParaRPr lang="en-US"/>
           </a:p>
@@ -1694,7 +1694,7 @@
           <a:p>
             <a:fld id="{D17AE834-0754-0944-8EF4-349530BA008F}" type="datetimeFigureOut">
               <a:rPr lang="en-US" smtClean="0"/>
-              <a:t>9/13/21</a:t>
+              <a:t>9/15/21</a:t>
             </a:fld>
             <a:endParaRPr lang="en-US"/>
           </a:p>
@@ -2061,7 +2061,7 @@
           <a:p>
             <a:fld id="{D17AE834-0754-0944-8EF4-349530BA008F}" type="datetimeFigureOut">
               <a:rPr lang="en-US" smtClean="0"/>
-              <a:t>9/13/21</a:t>
+              <a:t>9/15/21</a:t>
             </a:fld>
             <a:endParaRPr lang="en-US"/>
           </a:p>
@@ -2179,7 +2179,7 @@
           <a:p>
             <a:fld id="{D17AE834-0754-0944-8EF4-349530BA008F}" type="datetimeFigureOut">
               <a:rPr lang="en-US" smtClean="0"/>
-              <a:t>9/13/21</a:t>
+              <a:t>9/15/21</a:t>
             </a:fld>
             <a:endParaRPr lang="en-US"/>
           </a:p>
@@ -2274,7 +2274,7 @@
           <a:p>
             <a:fld id="{D17AE834-0754-0944-8EF4-349530BA008F}" type="datetimeFigureOut">
               <a:rPr lang="en-US" smtClean="0"/>
-              <a:t>9/13/21</a:t>
+              <a:t>9/15/21</a:t>
             </a:fld>
             <a:endParaRPr lang="en-US"/>
           </a:p>
@@ -2551,7 +2551,7 @@
           <a:p>
             <a:fld id="{D17AE834-0754-0944-8EF4-349530BA008F}" type="datetimeFigureOut">
               <a:rPr lang="en-US" smtClean="0"/>
-              <a:t>9/13/21</a:t>
+              <a:t>9/15/21</a:t>
             </a:fld>
             <a:endParaRPr lang="en-US"/>
           </a:p>
@@ -2808,7 +2808,7 @@
           <a:p>
             <a:fld id="{D17AE834-0754-0944-8EF4-349530BA008F}" type="datetimeFigureOut">
               <a:rPr lang="en-US" smtClean="0"/>
-              <a:t>9/13/21</a:t>
+              <a:t>9/15/21</a:t>
             </a:fld>
             <a:endParaRPr lang="en-US"/>
           </a:p>
@@ -3021,7 +3021,7 @@
           <a:p>
             <a:fld id="{D17AE834-0754-0944-8EF4-349530BA008F}" type="datetimeFigureOut">
               <a:rPr lang="en-US" smtClean="0"/>
-              <a:t>9/13/21</a:t>
+              <a:t>9/15/21</a:t>
             </a:fld>
             <a:endParaRPr lang="en-US"/>
           </a:p>
@@ -3558,7 +3558,7 @@
           <a:p>
             <a:r>
               <a:rPr lang="en-US" dirty="0"/>
-              <a:t>2. Make a tidy database, continued</a:t>
+              <a:t>2. Make a database ready for R, continued</a:t>
             </a:r>
           </a:p>
         </p:txBody>
@@ -3976,15 +3976,7 @@
           <a:p>
             <a:r>
               <a:rPr lang="en-US" dirty="0"/>
-              <a:t>3. </a:t>
-            </a:r>
-            <a:r>
-              <a:rPr lang="en-US" dirty="0" err="1"/>
-              <a:t>Styleguide</a:t>
-            </a:r>
-            <a:r>
-              <a:rPr lang="en-US" dirty="0"/>
-              <a:t>: Filenames</a:t>
+              <a:t>Naming files</a:t>
             </a:r>
           </a:p>
         </p:txBody>
@@ -5781,7 +5773,7 @@
           <a:p>
             <a:r>
               <a:rPr lang="en-US" dirty="0"/>
-              <a:t>2. Make a tidy database</a:t>
+              <a:t>2. Use the tidy format for your database</a:t>
             </a:r>
           </a:p>
         </p:txBody>
@@ -5904,7 +5896,7 @@
           <a:p>
             <a:r>
               <a:rPr lang="en-US" dirty="0"/>
-              <a:t>2. Make a tidy database</a:t>
+              <a:t>2. Make a database ready for R</a:t>
             </a:r>
           </a:p>
         </p:txBody>

</xml_diff>